<commit_message>
sunum düzenleme ve kodların aktarılması
</commit_message>
<xml_diff>
--- a/presentations/07. Kod geliştirme ortamının kurulması.pptx
+++ b/presentations/07. Kod geliştirme ortamının kurulması.pptx
@@ -7,6 +7,16 @@
   <p:sldIdLst>
     <p:sldId id="256" r:id="rId2"/>
     <p:sldId id="257" r:id="rId3"/>
+    <p:sldId id="258" r:id="rId4"/>
+    <p:sldId id="259" r:id="rId5"/>
+    <p:sldId id="260" r:id="rId6"/>
+    <p:sldId id="261" r:id="rId7"/>
+    <p:sldId id="263" r:id="rId8"/>
+    <p:sldId id="262" r:id="rId9"/>
+    <p:sldId id="264" r:id="rId10"/>
+    <p:sldId id="265" r:id="rId11"/>
+    <p:sldId id="266" r:id="rId12"/>
+    <p:sldId id="267" r:id="rId13"/>
   </p:sldIdLst>
   <p:sldSz cx="12192000" cy="6858000"/>
   <p:notesSz cx="6858000" cy="9144000"/>
@@ -3411,6 +3421,1390 @@
 </p:sld>
 </file>
 
+<file path=ppt/slides/slide10.xml><?xml version="1.0" encoding="utf-8"?>
+<p:sld xmlns:a="http://schemas.openxmlformats.org/drawingml/2006/main" xmlns:r="http://schemas.openxmlformats.org/officeDocument/2006/relationships" xmlns:p="http://schemas.openxmlformats.org/presentationml/2006/main">
+  <p:cSld>
+    <p:spTree>
+      <p:nvGrpSpPr>
+        <p:cNvPr id="1" name=""/>
+        <p:cNvGrpSpPr/>
+        <p:nvPr/>
+      </p:nvGrpSpPr>
+      <p:grpSpPr>
+        <a:xfrm>
+          <a:off x="0" y="0"/>
+          <a:ext cx="0" cy="0"/>
+          <a:chOff x="0" y="0"/>
+          <a:chExt cx="0" cy="0"/>
+        </a:xfrm>
+      </p:grpSpPr>
+      <p:sp>
+        <p:nvSpPr>
+          <p:cNvPr id="4" name="İçerik Yer Tutucusu 2">
+            <a:extLst>
+              <a:ext uri="{FF2B5EF4-FFF2-40B4-BE49-F238E27FC236}">
+                <a16:creationId xmlns:a16="http://schemas.microsoft.com/office/drawing/2014/main" id="{3FAE0397-3F4E-41EC-AD8C-D61E7C8BD088}"/>
+              </a:ext>
+            </a:extLst>
+          </p:cNvPr>
+          <p:cNvSpPr txBox="1">
+            <a:spLocks/>
+          </p:cNvSpPr>
+          <p:nvPr/>
+        </p:nvSpPr>
+        <p:spPr>
+          <a:xfrm>
+            <a:off x="586933" y="1181924"/>
+            <a:ext cx="11018134" cy="5230451"/>
+          </a:xfrm>
+          <a:prstGeom prst="rect">
+            <a:avLst/>
+          </a:prstGeom>
+        </p:spPr>
+        <p:txBody>
+          <a:bodyPr vert="horz" lIns="91440" tIns="45720" rIns="91440" bIns="45720" rtlCol="0">
+            <a:normAutofit/>
+          </a:bodyPr>
+          <a:lstStyle>
+            <a:lvl1pPr marL="228600" indent="-228600" algn="l" defTabSz="914400" rtl="0" eaLnBrk="1" latinLnBrk="0" hangingPunct="1">
+              <a:lnSpc>
+                <a:spcPct val="90000"/>
+              </a:lnSpc>
+              <a:spcBef>
+                <a:spcPts val="1000"/>
+              </a:spcBef>
+              <a:buFont typeface="Arial" panose="020B0604020202020204" pitchFamily="34" charset="0"/>
+              <a:buChar char="•"/>
+              <a:defRPr sz="2800" kern="1200">
+                <a:solidFill>
+                  <a:schemeClr val="tx1"/>
+                </a:solidFill>
+                <a:latin typeface="+mn-lt"/>
+                <a:ea typeface="+mn-ea"/>
+                <a:cs typeface="+mn-cs"/>
+              </a:defRPr>
+            </a:lvl1pPr>
+            <a:lvl2pPr marL="685800" indent="-228600" algn="l" defTabSz="914400" rtl="0" eaLnBrk="1" latinLnBrk="0" hangingPunct="1">
+              <a:lnSpc>
+                <a:spcPct val="90000"/>
+              </a:lnSpc>
+              <a:spcBef>
+                <a:spcPts val="500"/>
+              </a:spcBef>
+              <a:buFont typeface="Arial" panose="020B0604020202020204" pitchFamily="34" charset="0"/>
+              <a:buChar char="•"/>
+              <a:defRPr sz="2400" kern="1200">
+                <a:solidFill>
+                  <a:schemeClr val="tx1"/>
+                </a:solidFill>
+                <a:latin typeface="+mn-lt"/>
+                <a:ea typeface="+mn-ea"/>
+                <a:cs typeface="+mn-cs"/>
+              </a:defRPr>
+            </a:lvl2pPr>
+            <a:lvl3pPr marL="1143000" indent="-228600" algn="l" defTabSz="914400" rtl="0" eaLnBrk="1" latinLnBrk="0" hangingPunct="1">
+              <a:lnSpc>
+                <a:spcPct val="90000"/>
+              </a:lnSpc>
+              <a:spcBef>
+                <a:spcPts val="500"/>
+              </a:spcBef>
+              <a:buFont typeface="Arial" panose="020B0604020202020204" pitchFamily="34" charset="0"/>
+              <a:buChar char="•"/>
+              <a:defRPr sz="2000" kern="1200">
+                <a:solidFill>
+                  <a:schemeClr val="tx1"/>
+                </a:solidFill>
+                <a:latin typeface="+mn-lt"/>
+                <a:ea typeface="+mn-ea"/>
+                <a:cs typeface="+mn-cs"/>
+              </a:defRPr>
+            </a:lvl3pPr>
+            <a:lvl4pPr marL="1600200" indent="-228600" algn="l" defTabSz="914400" rtl="0" eaLnBrk="1" latinLnBrk="0" hangingPunct="1">
+              <a:lnSpc>
+                <a:spcPct val="90000"/>
+              </a:lnSpc>
+              <a:spcBef>
+                <a:spcPts val="500"/>
+              </a:spcBef>
+              <a:buFont typeface="Arial" panose="020B0604020202020204" pitchFamily="34" charset="0"/>
+              <a:buChar char="•"/>
+              <a:defRPr sz="1800" kern="1200">
+                <a:solidFill>
+                  <a:schemeClr val="tx1"/>
+                </a:solidFill>
+                <a:latin typeface="+mn-lt"/>
+                <a:ea typeface="+mn-ea"/>
+                <a:cs typeface="+mn-cs"/>
+              </a:defRPr>
+            </a:lvl4pPr>
+            <a:lvl5pPr marL="2057400" indent="-228600" algn="l" defTabSz="914400" rtl="0" eaLnBrk="1" latinLnBrk="0" hangingPunct="1">
+              <a:lnSpc>
+                <a:spcPct val="90000"/>
+              </a:lnSpc>
+              <a:spcBef>
+                <a:spcPts val="500"/>
+              </a:spcBef>
+              <a:buFont typeface="Arial" panose="020B0604020202020204" pitchFamily="34" charset="0"/>
+              <a:buChar char="•"/>
+              <a:defRPr sz="1800" kern="1200">
+                <a:solidFill>
+                  <a:schemeClr val="tx1"/>
+                </a:solidFill>
+                <a:latin typeface="+mn-lt"/>
+                <a:ea typeface="+mn-ea"/>
+                <a:cs typeface="+mn-cs"/>
+              </a:defRPr>
+            </a:lvl5pPr>
+            <a:lvl6pPr marL="2514600" indent="-228600" algn="l" defTabSz="914400" rtl="0" eaLnBrk="1" latinLnBrk="0" hangingPunct="1">
+              <a:lnSpc>
+                <a:spcPct val="90000"/>
+              </a:lnSpc>
+              <a:spcBef>
+                <a:spcPts val="500"/>
+              </a:spcBef>
+              <a:buFont typeface="Arial" panose="020B0604020202020204" pitchFamily="34" charset="0"/>
+              <a:buChar char="•"/>
+              <a:defRPr sz="1800" kern="1200">
+                <a:solidFill>
+                  <a:schemeClr val="tx1"/>
+                </a:solidFill>
+                <a:latin typeface="+mn-lt"/>
+                <a:ea typeface="+mn-ea"/>
+                <a:cs typeface="+mn-cs"/>
+              </a:defRPr>
+            </a:lvl6pPr>
+            <a:lvl7pPr marL="2971800" indent="-228600" algn="l" defTabSz="914400" rtl="0" eaLnBrk="1" latinLnBrk="0" hangingPunct="1">
+              <a:lnSpc>
+                <a:spcPct val="90000"/>
+              </a:lnSpc>
+              <a:spcBef>
+                <a:spcPts val="500"/>
+              </a:spcBef>
+              <a:buFont typeface="Arial" panose="020B0604020202020204" pitchFamily="34" charset="0"/>
+              <a:buChar char="•"/>
+              <a:defRPr sz="1800" kern="1200">
+                <a:solidFill>
+                  <a:schemeClr val="tx1"/>
+                </a:solidFill>
+                <a:latin typeface="+mn-lt"/>
+                <a:ea typeface="+mn-ea"/>
+                <a:cs typeface="+mn-cs"/>
+              </a:defRPr>
+            </a:lvl7pPr>
+            <a:lvl8pPr marL="3429000" indent="-228600" algn="l" defTabSz="914400" rtl="0" eaLnBrk="1" latinLnBrk="0" hangingPunct="1">
+              <a:lnSpc>
+                <a:spcPct val="90000"/>
+              </a:lnSpc>
+              <a:spcBef>
+                <a:spcPts val="500"/>
+              </a:spcBef>
+              <a:buFont typeface="Arial" panose="020B0604020202020204" pitchFamily="34" charset="0"/>
+              <a:buChar char="•"/>
+              <a:defRPr sz="1800" kern="1200">
+                <a:solidFill>
+                  <a:schemeClr val="tx1"/>
+                </a:solidFill>
+                <a:latin typeface="+mn-lt"/>
+                <a:ea typeface="+mn-ea"/>
+                <a:cs typeface="+mn-cs"/>
+              </a:defRPr>
+            </a:lvl8pPr>
+            <a:lvl9pPr marL="3886200" indent="-228600" algn="l" defTabSz="914400" rtl="0" eaLnBrk="1" latinLnBrk="0" hangingPunct="1">
+              <a:lnSpc>
+                <a:spcPct val="90000"/>
+              </a:lnSpc>
+              <a:spcBef>
+                <a:spcPts val="500"/>
+              </a:spcBef>
+              <a:buFont typeface="Arial" panose="020B0604020202020204" pitchFamily="34" charset="0"/>
+              <a:buChar char="•"/>
+              <a:defRPr sz="1800" kern="1200">
+                <a:solidFill>
+                  <a:schemeClr val="tx1"/>
+                </a:solidFill>
+                <a:latin typeface="+mn-lt"/>
+                <a:ea typeface="+mn-ea"/>
+                <a:cs typeface="+mn-cs"/>
+              </a:defRPr>
+            </a:lvl9pPr>
+          </a:lstStyle>
+          <a:p>
+            <a:r>
+              <a:rPr lang="tr-TR" dirty="0"/>
+              <a:t>Sanal ortamı aktif hale getirme</a:t>
+            </a:r>
+          </a:p>
+          <a:p>
+            <a:pPr marL="0" indent="0">
+              <a:buFont typeface="Arial" panose="020B0604020202020204" pitchFamily="34" charset="0"/>
+              <a:buNone/>
+            </a:pPr>
+            <a:r>
+              <a:rPr lang="tr-TR" dirty="0">
+                <a:latin typeface="Consolas" panose="020B0609020204030204" pitchFamily="49" charset="0"/>
+              </a:rPr>
+              <a:t>	</a:t>
+            </a:r>
+            <a:r>
+              <a:rPr lang="tr-TR" dirty="0">
+                <a:solidFill>
+                  <a:srgbClr val="FF0000"/>
+                </a:solidFill>
+                <a:latin typeface="Consolas" panose="020B0609020204030204" pitchFamily="49" charset="0"/>
+              </a:rPr>
+              <a:t>&gt;cd </a:t>
+            </a:r>
+            <a:r>
+              <a:rPr lang="tr-TR" dirty="0" err="1">
+                <a:solidFill>
+                  <a:srgbClr val="FF0000"/>
+                </a:solidFill>
+                <a:latin typeface="Consolas" panose="020B0609020204030204" pitchFamily="49" charset="0"/>
+              </a:rPr>
+              <a:t>Scripts</a:t>
+            </a:r>
+            <a:endParaRPr lang="tr-TR" dirty="0">
+              <a:solidFill>
+                <a:srgbClr val="FF0000"/>
+              </a:solidFill>
+              <a:latin typeface="Consolas" panose="020B0609020204030204" pitchFamily="49" charset="0"/>
+            </a:endParaRPr>
+          </a:p>
+          <a:p>
+            <a:pPr marL="0" indent="0">
+              <a:buNone/>
+            </a:pPr>
+            <a:r>
+              <a:rPr lang="tr-TR" dirty="0">
+                <a:solidFill>
+                  <a:srgbClr val="FF0000"/>
+                </a:solidFill>
+                <a:latin typeface="Consolas" panose="020B0609020204030204" pitchFamily="49" charset="0"/>
+              </a:rPr>
+              <a:t>	&gt;</a:t>
+            </a:r>
+            <a:r>
+              <a:rPr lang="tr-TR" dirty="0" err="1">
+                <a:solidFill>
+                  <a:srgbClr val="FF0000"/>
+                </a:solidFill>
+                <a:latin typeface="Consolas" panose="020B0609020204030204" pitchFamily="49" charset="0"/>
+              </a:rPr>
+              <a:t>activate</a:t>
+            </a:r>
+            <a:endParaRPr lang="tr-TR" dirty="0">
+              <a:solidFill>
+                <a:srgbClr val="FF0000"/>
+              </a:solidFill>
+              <a:latin typeface="Consolas" panose="020B0609020204030204" pitchFamily="49" charset="0"/>
+            </a:endParaRPr>
+          </a:p>
+          <a:p>
+            <a:r>
+              <a:rPr lang="tr-TR" dirty="0"/>
+              <a:t>Sonuç</a:t>
+            </a:r>
+          </a:p>
+          <a:p>
+            <a:pPr marL="0" indent="0">
+              <a:buNone/>
+            </a:pPr>
+            <a:r>
+              <a:rPr lang="tr-TR" dirty="0">
+                <a:solidFill>
+                  <a:srgbClr val="FF0000"/>
+                </a:solidFill>
+                <a:latin typeface="Consolas" panose="020B0609020204030204" pitchFamily="49" charset="0"/>
+              </a:rPr>
+              <a:t>(ml) </a:t>
+            </a:r>
+            <a:r>
+              <a:rPr lang="tr-TR" dirty="0">
+                <a:latin typeface="Consolas" panose="020B0609020204030204" pitchFamily="49" charset="0"/>
+              </a:rPr>
+              <a:t>C:\Users\user\python_egitim\ml\Scripts&gt;</a:t>
+            </a:r>
+          </a:p>
+          <a:p>
+            <a:pPr marL="0" indent="0">
+              <a:buNone/>
+            </a:pPr>
+            <a:endParaRPr lang="tr-TR" dirty="0">
+              <a:latin typeface="Consolas" panose="020B0609020204030204" pitchFamily="49" charset="0"/>
+            </a:endParaRPr>
+          </a:p>
+          <a:p>
+            <a:r>
+              <a:rPr lang="tr-TR" dirty="0"/>
+              <a:t>Dev klasörüne geçme</a:t>
+            </a:r>
+          </a:p>
+          <a:p>
+            <a:pPr marL="0" indent="0">
+              <a:buNone/>
+            </a:pPr>
+            <a:r>
+              <a:rPr lang="tr-TR" dirty="0"/>
+              <a:t>	</a:t>
+            </a:r>
+            <a:r>
+              <a:rPr lang="tr-TR" dirty="0">
+                <a:solidFill>
+                  <a:srgbClr val="FF0000"/>
+                </a:solidFill>
+                <a:latin typeface="Consolas" panose="020B0609020204030204" pitchFamily="49" charset="0"/>
+              </a:rPr>
+              <a:t> &gt;cd ..</a:t>
+            </a:r>
+          </a:p>
+          <a:p>
+            <a:pPr marL="0" indent="0">
+              <a:buNone/>
+            </a:pPr>
+            <a:r>
+              <a:rPr lang="tr-TR" dirty="0">
+                <a:solidFill>
+                  <a:srgbClr val="FF0000"/>
+                </a:solidFill>
+                <a:latin typeface="Consolas" panose="020B0609020204030204" pitchFamily="49" charset="0"/>
+              </a:rPr>
+              <a:t>	 &gt;cd dev</a:t>
+            </a:r>
+            <a:endParaRPr lang="tr-TR" dirty="0"/>
+          </a:p>
+          <a:p>
+            <a:pPr marL="0" indent="0">
+              <a:buNone/>
+            </a:pPr>
+            <a:endParaRPr lang="tr-TR" dirty="0">
+              <a:latin typeface="Consolas" panose="020B0609020204030204" pitchFamily="49" charset="0"/>
+            </a:endParaRPr>
+          </a:p>
+        </p:txBody>
+      </p:sp>
+      <p:sp>
+        <p:nvSpPr>
+          <p:cNvPr id="7" name="Unvan 1">
+            <a:extLst>
+              <a:ext uri="{FF2B5EF4-FFF2-40B4-BE49-F238E27FC236}">
+                <a16:creationId xmlns:a16="http://schemas.microsoft.com/office/drawing/2014/main" id="{874704D3-D16C-4D8E-8384-BE18FA6F9380}"/>
+              </a:ext>
+            </a:extLst>
+          </p:cNvPr>
+          <p:cNvSpPr>
+            <a:spLocks noGrp="1"/>
+          </p:cNvSpPr>
+          <p:nvPr>
+            <p:ph type="title"/>
+          </p:nvPr>
+        </p:nvSpPr>
+        <p:spPr>
+          <a:xfrm>
+            <a:off x="838200" y="325398"/>
+            <a:ext cx="10515600" cy="722895"/>
+          </a:xfrm>
+        </p:spPr>
+        <p:txBody>
+          <a:bodyPr>
+            <a:normAutofit/>
+          </a:bodyPr>
+          <a:lstStyle/>
+          <a:p>
+            <a:pPr algn="ctr"/>
+            <a:r>
+              <a:rPr lang="en-US" sz="3800" b="1" dirty="0">
+                <a:solidFill>
+                  <a:srgbClr val="FF1F20"/>
+                </a:solidFill>
+                <a:latin typeface="Arial" panose="020B0604020202020204" pitchFamily="34" charset="0"/>
+                <a:ea typeface="Verdana" panose="020B0604030504040204" pitchFamily="34" charset="0"/>
+                <a:cs typeface="Arial" panose="020B0604020202020204" pitchFamily="34" charset="0"/>
+              </a:rPr>
+              <a:t>PYTHON </a:t>
+            </a:r>
+            <a:r>
+              <a:rPr lang="tr-TR" sz="3800" b="1" dirty="0">
+                <a:solidFill>
+                  <a:srgbClr val="FF1F20"/>
+                </a:solidFill>
+                <a:latin typeface="Arial" panose="020B0604020202020204" pitchFamily="34" charset="0"/>
+                <a:ea typeface="Verdana" panose="020B0604030504040204" pitchFamily="34" charset="0"/>
+                <a:cs typeface="Arial" panose="020B0604020202020204" pitchFamily="34" charset="0"/>
+              </a:rPr>
+              <a:t>VIRTUALENV</a:t>
+            </a:r>
+            <a:endParaRPr lang="en-US" sz="3800" b="1" dirty="0">
+              <a:solidFill>
+                <a:srgbClr val="FF1F20"/>
+              </a:solidFill>
+              <a:latin typeface="Arial" panose="020B0604020202020204" pitchFamily="34" charset="0"/>
+              <a:ea typeface="Verdana" panose="020B0604030504040204" pitchFamily="34" charset="0"/>
+              <a:cs typeface="Arial" panose="020B0604020202020204" pitchFamily="34" charset="0"/>
+            </a:endParaRPr>
+          </a:p>
+        </p:txBody>
+      </p:sp>
+    </p:spTree>
+    <p:extLst>
+      <p:ext uri="{BB962C8B-B14F-4D97-AF65-F5344CB8AC3E}">
+        <p14:creationId xmlns:p14="http://schemas.microsoft.com/office/powerpoint/2010/main" val="3075339700"/>
+      </p:ext>
+    </p:extLst>
+  </p:cSld>
+  <p:clrMapOvr>
+    <a:masterClrMapping/>
+  </p:clrMapOvr>
+</p:sld>
+</file>
+
+<file path=ppt/slides/slide11.xml><?xml version="1.0" encoding="utf-8"?>
+<p:sld xmlns:a="http://schemas.openxmlformats.org/drawingml/2006/main" xmlns:r="http://schemas.openxmlformats.org/officeDocument/2006/relationships" xmlns:p="http://schemas.openxmlformats.org/presentationml/2006/main">
+  <p:cSld>
+    <p:spTree>
+      <p:nvGrpSpPr>
+        <p:cNvPr id="1" name=""/>
+        <p:cNvGrpSpPr/>
+        <p:nvPr/>
+      </p:nvGrpSpPr>
+      <p:grpSpPr>
+        <a:xfrm>
+          <a:off x="0" y="0"/>
+          <a:ext cx="0" cy="0"/>
+          <a:chOff x="0" y="0"/>
+          <a:chExt cx="0" cy="0"/>
+        </a:xfrm>
+      </p:grpSpPr>
+      <p:sp>
+        <p:nvSpPr>
+          <p:cNvPr id="4" name="İçerik Yer Tutucusu 2">
+            <a:extLst>
+              <a:ext uri="{FF2B5EF4-FFF2-40B4-BE49-F238E27FC236}">
+                <a16:creationId xmlns:a16="http://schemas.microsoft.com/office/drawing/2014/main" id="{3FAE0397-3F4E-41EC-AD8C-D61E7C8BD088}"/>
+              </a:ext>
+            </a:extLst>
+          </p:cNvPr>
+          <p:cNvSpPr txBox="1">
+            <a:spLocks/>
+          </p:cNvSpPr>
+          <p:nvPr/>
+        </p:nvSpPr>
+        <p:spPr>
+          <a:xfrm>
+            <a:off x="586933" y="1181924"/>
+            <a:ext cx="11018134" cy="5230451"/>
+          </a:xfrm>
+          <a:prstGeom prst="rect">
+            <a:avLst/>
+          </a:prstGeom>
+        </p:spPr>
+        <p:txBody>
+          <a:bodyPr vert="horz" lIns="91440" tIns="45720" rIns="91440" bIns="45720" rtlCol="0">
+            <a:normAutofit/>
+          </a:bodyPr>
+          <a:lstStyle>
+            <a:lvl1pPr marL="228600" indent="-228600" algn="l" defTabSz="914400" rtl="0" eaLnBrk="1" latinLnBrk="0" hangingPunct="1">
+              <a:lnSpc>
+                <a:spcPct val="90000"/>
+              </a:lnSpc>
+              <a:spcBef>
+                <a:spcPts val="1000"/>
+              </a:spcBef>
+              <a:buFont typeface="Arial" panose="020B0604020202020204" pitchFamily="34" charset="0"/>
+              <a:buChar char="•"/>
+              <a:defRPr sz="2800" kern="1200">
+                <a:solidFill>
+                  <a:schemeClr val="tx1"/>
+                </a:solidFill>
+                <a:latin typeface="+mn-lt"/>
+                <a:ea typeface="+mn-ea"/>
+                <a:cs typeface="+mn-cs"/>
+              </a:defRPr>
+            </a:lvl1pPr>
+            <a:lvl2pPr marL="685800" indent="-228600" algn="l" defTabSz="914400" rtl="0" eaLnBrk="1" latinLnBrk="0" hangingPunct="1">
+              <a:lnSpc>
+                <a:spcPct val="90000"/>
+              </a:lnSpc>
+              <a:spcBef>
+                <a:spcPts val="500"/>
+              </a:spcBef>
+              <a:buFont typeface="Arial" panose="020B0604020202020204" pitchFamily="34" charset="0"/>
+              <a:buChar char="•"/>
+              <a:defRPr sz="2400" kern="1200">
+                <a:solidFill>
+                  <a:schemeClr val="tx1"/>
+                </a:solidFill>
+                <a:latin typeface="+mn-lt"/>
+                <a:ea typeface="+mn-ea"/>
+                <a:cs typeface="+mn-cs"/>
+              </a:defRPr>
+            </a:lvl2pPr>
+            <a:lvl3pPr marL="1143000" indent="-228600" algn="l" defTabSz="914400" rtl="0" eaLnBrk="1" latinLnBrk="0" hangingPunct="1">
+              <a:lnSpc>
+                <a:spcPct val="90000"/>
+              </a:lnSpc>
+              <a:spcBef>
+                <a:spcPts val="500"/>
+              </a:spcBef>
+              <a:buFont typeface="Arial" panose="020B0604020202020204" pitchFamily="34" charset="0"/>
+              <a:buChar char="•"/>
+              <a:defRPr sz="2000" kern="1200">
+                <a:solidFill>
+                  <a:schemeClr val="tx1"/>
+                </a:solidFill>
+                <a:latin typeface="+mn-lt"/>
+                <a:ea typeface="+mn-ea"/>
+                <a:cs typeface="+mn-cs"/>
+              </a:defRPr>
+            </a:lvl3pPr>
+            <a:lvl4pPr marL="1600200" indent="-228600" algn="l" defTabSz="914400" rtl="0" eaLnBrk="1" latinLnBrk="0" hangingPunct="1">
+              <a:lnSpc>
+                <a:spcPct val="90000"/>
+              </a:lnSpc>
+              <a:spcBef>
+                <a:spcPts val="500"/>
+              </a:spcBef>
+              <a:buFont typeface="Arial" panose="020B0604020202020204" pitchFamily="34" charset="0"/>
+              <a:buChar char="•"/>
+              <a:defRPr sz="1800" kern="1200">
+                <a:solidFill>
+                  <a:schemeClr val="tx1"/>
+                </a:solidFill>
+                <a:latin typeface="+mn-lt"/>
+                <a:ea typeface="+mn-ea"/>
+                <a:cs typeface="+mn-cs"/>
+              </a:defRPr>
+            </a:lvl4pPr>
+            <a:lvl5pPr marL="2057400" indent="-228600" algn="l" defTabSz="914400" rtl="0" eaLnBrk="1" latinLnBrk="0" hangingPunct="1">
+              <a:lnSpc>
+                <a:spcPct val="90000"/>
+              </a:lnSpc>
+              <a:spcBef>
+                <a:spcPts val="500"/>
+              </a:spcBef>
+              <a:buFont typeface="Arial" panose="020B0604020202020204" pitchFamily="34" charset="0"/>
+              <a:buChar char="•"/>
+              <a:defRPr sz="1800" kern="1200">
+                <a:solidFill>
+                  <a:schemeClr val="tx1"/>
+                </a:solidFill>
+                <a:latin typeface="+mn-lt"/>
+                <a:ea typeface="+mn-ea"/>
+                <a:cs typeface="+mn-cs"/>
+              </a:defRPr>
+            </a:lvl5pPr>
+            <a:lvl6pPr marL="2514600" indent="-228600" algn="l" defTabSz="914400" rtl="0" eaLnBrk="1" latinLnBrk="0" hangingPunct="1">
+              <a:lnSpc>
+                <a:spcPct val="90000"/>
+              </a:lnSpc>
+              <a:spcBef>
+                <a:spcPts val="500"/>
+              </a:spcBef>
+              <a:buFont typeface="Arial" panose="020B0604020202020204" pitchFamily="34" charset="0"/>
+              <a:buChar char="•"/>
+              <a:defRPr sz="1800" kern="1200">
+                <a:solidFill>
+                  <a:schemeClr val="tx1"/>
+                </a:solidFill>
+                <a:latin typeface="+mn-lt"/>
+                <a:ea typeface="+mn-ea"/>
+                <a:cs typeface="+mn-cs"/>
+              </a:defRPr>
+            </a:lvl6pPr>
+            <a:lvl7pPr marL="2971800" indent="-228600" algn="l" defTabSz="914400" rtl="0" eaLnBrk="1" latinLnBrk="0" hangingPunct="1">
+              <a:lnSpc>
+                <a:spcPct val="90000"/>
+              </a:lnSpc>
+              <a:spcBef>
+                <a:spcPts val="500"/>
+              </a:spcBef>
+              <a:buFont typeface="Arial" panose="020B0604020202020204" pitchFamily="34" charset="0"/>
+              <a:buChar char="•"/>
+              <a:defRPr sz="1800" kern="1200">
+                <a:solidFill>
+                  <a:schemeClr val="tx1"/>
+                </a:solidFill>
+                <a:latin typeface="+mn-lt"/>
+                <a:ea typeface="+mn-ea"/>
+                <a:cs typeface="+mn-cs"/>
+              </a:defRPr>
+            </a:lvl7pPr>
+            <a:lvl8pPr marL="3429000" indent="-228600" algn="l" defTabSz="914400" rtl="0" eaLnBrk="1" latinLnBrk="0" hangingPunct="1">
+              <a:lnSpc>
+                <a:spcPct val="90000"/>
+              </a:lnSpc>
+              <a:spcBef>
+                <a:spcPts val="500"/>
+              </a:spcBef>
+              <a:buFont typeface="Arial" panose="020B0604020202020204" pitchFamily="34" charset="0"/>
+              <a:buChar char="•"/>
+              <a:defRPr sz="1800" kern="1200">
+                <a:solidFill>
+                  <a:schemeClr val="tx1"/>
+                </a:solidFill>
+                <a:latin typeface="+mn-lt"/>
+                <a:ea typeface="+mn-ea"/>
+                <a:cs typeface="+mn-cs"/>
+              </a:defRPr>
+            </a:lvl8pPr>
+            <a:lvl9pPr marL="3886200" indent="-228600" algn="l" defTabSz="914400" rtl="0" eaLnBrk="1" latinLnBrk="0" hangingPunct="1">
+              <a:lnSpc>
+                <a:spcPct val="90000"/>
+              </a:lnSpc>
+              <a:spcBef>
+                <a:spcPts val="500"/>
+              </a:spcBef>
+              <a:buFont typeface="Arial" panose="020B0604020202020204" pitchFamily="34" charset="0"/>
+              <a:buChar char="•"/>
+              <a:defRPr sz="1800" kern="1200">
+                <a:solidFill>
+                  <a:schemeClr val="tx1"/>
+                </a:solidFill>
+                <a:latin typeface="+mn-lt"/>
+                <a:ea typeface="+mn-ea"/>
+                <a:cs typeface="+mn-cs"/>
+              </a:defRPr>
+            </a:lvl9pPr>
+          </a:lstStyle>
+          <a:p>
+            <a:r>
+              <a:rPr lang="tr-TR" dirty="0"/>
+              <a:t>Sanal ortamdan çıkma</a:t>
+            </a:r>
+          </a:p>
+          <a:p>
+            <a:pPr marL="0" indent="0">
+              <a:buFont typeface="Arial" panose="020B0604020202020204" pitchFamily="34" charset="0"/>
+              <a:buNone/>
+            </a:pPr>
+            <a:r>
+              <a:rPr lang="tr-TR" dirty="0">
+                <a:latin typeface="Consolas" panose="020B0609020204030204" pitchFamily="49" charset="0"/>
+              </a:rPr>
+              <a:t>	</a:t>
+            </a:r>
+            <a:r>
+              <a:rPr lang="tr-TR" dirty="0">
+                <a:solidFill>
+                  <a:srgbClr val="FF0000"/>
+                </a:solidFill>
+                <a:latin typeface="Consolas" panose="020B0609020204030204" pitchFamily="49" charset="0"/>
+              </a:rPr>
+              <a:t>&gt;</a:t>
+            </a:r>
+            <a:r>
+              <a:rPr lang="tr-TR" dirty="0" err="1">
+                <a:solidFill>
+                  <a:srgbClr val="FF0000"/>
+                </a:solidFill>
+                <a:latin typeface="Consolas" panose="020B0609020204030204" pitchFamily="49" charset="0"/>
+              </a:rPr>
+              <a:t>deactivate</a:t>
+            </a:r>
+            <a:endParaRPr lang="tr-TR" dirty="0">
+              <a:solidFill>
+                <a:srgbClr val="FF0000"/>
+              </a:solidFill>
+              <a:latin typeface="Consolas" panose="020B0609020204030204" pitchFamily="49" charset="0"/>
+            </a:endParaRPr>
+          </a:p>
+          <a:p>
+            <a:pPr marL="0" indent="0">
+              <a:buFont typeface="Arial" panose="020B0604020202020204" pitchFamily="34" charset="0"/>
+              <a:buNone/>
+            </a:pPr>
+            <a:endParaRPr lang="tr-TR" dirty="0">
+              <a:solidFill>
+                <a:srgbClr val="FF0000"/>
+              </a:solidFill>
+              <a:latin typeface="Consolas" panose="020B0609020204030204" pitchFamily="49" charset="0"/>
+            </a:endParaRPr>
+          </a:p>
+          <a:p>
+            <a:r>
+              <a:rPr lang="tr-TR" dirty="0"/>
+              <a:t>Sonuç</a:t>
+            </a:r>
+          </a:p>
+          <a:p>
+            <a:pPr marL="457200" lvl="1" indent="0">
+              <a:buNone/>
+            </a:pPr>
+            <a:r>
+              <a:rPr lang="tr-TR" dirty="0"/>
+              <a:t>	</a:t>
+            </a:r>
+            <a:r>
+              <a:rPr lang="tr-TR" sz="2800" dirty="0">
+                <a:solidFill>
+                  <a:srgbClr val="FF0000"/>
+                </a:solidFill>
+                <a:latin typeface="Consolas" panose="020B0609020204030204" pitchFamily="49" charset="0"/>
+              </a:rPr>
+              <a:t>C:\Users\user\python_egitim\ml\dev&gt;</a:t>
+            </a:r>
+          </a:p>
+          <a:p>
+            <a:pPr marL="457200" lvl="1" indent="0">
+              <a:buNone/>
+            </a:pPr>
+            <a:r>
+              <a:rPr lang="tr-TR" sz="2800" dirty="0">
+                <a:latin typeface="+mj-lt"/>
+              </a:rPr>
+              <a:t>	baş taraftaki (ml) gitti.</a:t>
+            </a:r>
+          </a:p>
+          <a:p>
+            <a:pPr marL="457200" lvl="1" indent="0">
+              <a:buNone/>
+            </a:pPr>
+            <a:endParaRPr lang="tr-TR" dirty="0">
+              <a:latin typeface="+mj-lt"/>
+            </a:endParaRPr>
+          </a:p>
+          <a:p>
+            <a:r>
+              <a:rPr lang="tr-TR" dirty="0" err="1">
+                <a:latin typeface="Consolas" panose="020B0609020204030204" pitchFamily="49" charset="0"/>
+              </a:rPr>
+              <a:t>activate</a:t>
+            </a:r>
+            <a:r>
+              <a:rPr lang="tr-TR" dirty="0"/>
+              <a:t> komutunu sadece </a:t>
+            </a:r>
+            <a:r>
+              <a:rPr lang="tr-TR" dirty="0" err="1"/>
+              <a:t>Scripts</a:t>
+            </a:r>
+            <a:r>
+              <a:rPr lang="tr-TR" dirty="0"/>
+              <a:t> dosyası içinde verebilirken </a:t>
+            </a:r>
+            <a:r>
+              <a:rPr lang="tr-TR" dirty="0" err="1">
+                <a:latin typeface="Consolas" panose="020B0609020204030204" pitchFamily="49" charset="0"/>
+              </a:rPr>
+              <a:t>deactivate</a:t>
+            </a:r>
+            <a:r>
+              <a:rPr lang="tr-TR" dirty="0"/>
+              <a:t> komutunu herhangi bir yerden verebiliriz.</a:t>
+            </a:r>
+          </a:p>
+        </p:txBody>
+      </p:sp>
+      <p:sp>
+        <p:nvSpPr>
+          <p:cNvPr id="7" name="Unvan 1">
+            <a:extLst>
+              <a:ext uri="{FF2B5EF4-FFF2-40B4-BE49-F238E27FC236}">
+                <a16:creationId xmlns:a16="http://schemas.microsoft.com/office/drawing/2014/main" id="{874704D3-D16C-4D8E-8384-BE18FA6F9380}"/>
+              </a:ext>
+            </a:extLst>
+          </p:cNvPr>
+          <p:cNvSpPr>
+            <a:spLocks noGrp="1"/>
+          </p:cNvSpPr>
+          <p:nvPr>
+            <p:ph type="title"/>
+          </p:nvPr>
+        </p:nvSpPr>
+        <p:spPr>
+          <a:xfrm>
+            <a:off x="838200" y="325398"/>
+            <a:ext cx="10515600" cy="722895"/>
+          </a:xfrm>
+        </p:spPr>
+        <p:txBody>
+          <a:bodyPr>
+            <a:normAutofit/>
+          </a:bodyPr>
+          <a:lstStyle/>
+          <a:p>
+            <a:pPr algn="ctr"/>
+            <a:r>
+              <a:rPr lang="en-US" sz="3800" b="1" dirty="0">
+                <a:solidFill>
+                  <a:srgbClr val="FF1F20"/>
+                </a:solidFill>
+                <a:latin typeface="Arial" panose="020B0604020202020204" pitchFamily="34" charset="0"/>
+                <a:ea typeface="Verdana" panose="020B0604030504040204" pitchFamily="34" charset="0"/>
+                <a:cs typeface="Arial" panose="020B0604020202020204" pitchFamily="34" charset="0"/>
+              </a:rPr>
+              <a:t>PYTHON </a:t>
+            </a:r>
+            <a:r>
+              <a:rPr lang="tr-TR" sz="3800" b="1" dirty="0">
+                <a:solidFill>
+                  <a:srgbClr val="FF1F20"/>
+                </a:solidFill>
+                <a:latin typeface="Arial" panose="020B0604020202020204" pitchFamily="34" charset="0"/>
+                <a:ea typeface="Verdana" panose="020B0604030504040204" pitchFamily="34" charset="0"/>
+                <a:cs typeface="Arial" panose="020B0604020202020204" pitchFamily="34" charset="0"/>
+              </a:rPr>
+              <a:t>VIRTUALENV</a:t>
+            </a:r>
+            <a:endParaRPr lang="en-US" sz="3800" b="1" dirty="0">
+              <a:solidFill>
+                <a:srgbClr val="FF1F20"/>
+              </a:solidFill>
+              <a:latin typeface="Arial" panose="020B0604020202020204" pitchFamily="34" charset="0"/>
+              <a:ea typeface="Verdana" panose="020B0604030504040204" pitchFamily="34" charset="0"/>
+              <a:cs typeface="Arial" panose="020B0604020202020204" pitchFamily="34" charset="0"/>
+            </a:endParaRPr>
+          </a:p>
+        </p:txBody>
+      </p:sp>
+    </p:spTree>
+    <p:extLst>
+      <p:ext uri="{BB962C8B-B14F-4D97-AF65-F5344CB8AC3E}">
+        <p14:creationId xmlns:p14="http://schemas.microsoft.com/office/powerpoint/2010/main" val="411932357"/>
+      </p:ext>
+    </p:extLst>
+  </p:cSld>
+  <p:clrMapOvr>
+    <a:masterClrMapping/>
+  </p:clrMapOvr>
+</p:sld>
+</file>
+
+<file path=ppt/slides/slide12.xml><?xml version="1.0" encoding="utf-8"?>
+<p:sld xmlns:a="http://schemas.openxmlformats.org/drawingml/2006/main" xmlns:r="http://schemas.openxmlformats.org/officeDocument/2006/relationships" xmlns:p="http://schemas.openxmlformats.org/presentationml/2006/main">
+  <p:cSld>
+    <p:spTree>
+      <p:nvGrpSpPr>
+        <p:cNvPr id="1" name=""/>
+        <p:cNvGrpSpPr/>
+        <p:nvPr/>
+      </p:nvGrpSpPr>
+      <p:grpSpPr>
+        <a:xfrm>
+          <a:off x="0" y="0"/>
+          <a:ext cx="0" cy="0"/>
+          <a:chOff x="0" y="0"/>
+          <a:chExt cx="0" cy="0"/>
+        </a:xfrm>
+      </p:grpSpPr>
+      <p:sp>
+        <p:nvSpPr>
+          <p:cNvPr id="4" name="İçerik Yer Tutucusu 2">
+            <a:extLst>
+              <a:ext uri="{FF2B5EF4-FFF2-40B4-BE49-F238E27FC236}">
+                <a16:creationId xmlns:a16="http://schemas.microsoft.com/office/drawing/2014/main" id="{3FAE0397-3F4E-41EC-AD8C-D61E7C8BD088}"/>
+              </a:ext>
+            </a:extLst>
+          </p:cNvPr>
+          <p:cNvSpPr txBox="1">
+            <a:spLocks/>
+          </p:cNvSpPr>
+          <p:nvPr/>
+        </p:nvSpPr>
+        <p:spPr>
+          <a:xfrm>
+            <a:off x="586933" y="1181924"/>
+            <a:ext cx="11018134" cy="5230451"/>
+          </a:xfrm>
+          <a:prstGeom prst="rect">
+            <a:avLst/>
+          </a:prstGeom>
+        </p:spPr>
+        <p:txBody>
+          <a:bodyPr vert="horz" lIns="91440" tIns="45720" rIns="91440" bIns="45720" rtlCol="0">
+            <a:normAutofit fontScale="62500" lnSpcReduction="20000"/>
+          </a:bodyPr>
+          <a:lstStyle>
+            <a:lvl1pPr marL="228600" indent="-228600" algn="l" defTabSz="914400" rtl="0" eaLnBrk="1" latinLnBrk="0" hangingPunct="1">
+              <a:lnSpc>
+                <a:spcPct val="90000"/>
+              </a:lnSpc>
+              <a:spcBef>
+                <a:spcPts val="1000"/>
+              </a:spcBef>
+              <a:buFont typeface="Arial" panose="020B0604020202020204" pitchFamily="34" charset="0"/>
+              <a:buChar char="•"/>
+              <a:defRPr sz="2800" kern="1200">
+                <a:solidFill>
+                  <a:schemeClr val="tx1"/>
+                </a:solidFill>
+                <a:latin typeface="+mn-lt"/>
+                <a:ea typeface="+mn-ea"/>
+                <a:cs typeface="+mn-cs"/>
+              </a:defRPr>
+            </a:lvl1pPr>
+            <a:lvl2pPr marL="685800" indent="-228600" algn="l" defTabSz="914400" rtl="0" eaLnBrk="1" latinLnBrk="0" hangingPunct="1">
+              <a:lnSpc>
+                <a:spcPct val="90000"/>
+              </a:lnSpc>
+              <a:spcBef>
+                <a:spcPts val="500"/>
+              </a:spcBef>
+              <a:buFont typeface="Arial" panose="020B0604020202020204" pitchFamily="34" charset="0"/>
+              <a:buChar char="•"/>
+              <a:defRPr sz="2400" kern="1200">
+                <a:solidFill>
+                  <a:schemeClr val="tx1"/>
+                </a:solidFill>
+                <a:latin typeface="+mn-lt"/>
+                <a:ea typeface="+mn-ea"/>
+                <a:cs typeface="+mn-cs"/>
+              </a:defRPr>
+            </a:lvl2pPr>
+            <a:lvl3pPr marL="1143000" indent="-228600" algn="l" defTabSz="914400" rtl="0" eaLnBrk="1" latinLnBrk="0" hangingPunct="1">
+              <a:lnSpc>
+                <a:spcPct val="90000"/>
+              </a:lnSpc>
+              <a:spcBef>
+                <a:spcPts val="500"/>
+              </a:spcBef>
+              <a:buFont typeface="Arial" panose="020B0604020202020204" pitchFamily="34" charset="0"/>
+              <a:buChar char="•"/>
+              <a:defRPr sz="2000" kern="1200">
+                <a:solidFill>
+                  <a:schemeClr val="tx1"/>
+                </a:solidFill>
+                <a:latin typeface="+mn-lt"/>
+                <a:ea typeface="+mn-ea"/>
+                <a:cs typeface="+mn-cs"/>
+              </a:defRPr>
+            </a:lvl3pPr>
+            <a:lvl4pPr marL="1600200" indent="-228600" algn="l" defTabSz="914400" rtl="0" eaLnBrk="1" latinLnBrk="0" hangingPunct="1">
+              <a:lnSpc>
+                <a:spcPct val="90000"/>
+              </a:lnSpc>
+              <a:spcBef>
+                <a:spcPts val="500"/>
+              </a:spcBef>
+              <a:buFont typeface="Arial" panose="020B0604020202020204" pitchFamily="34" charset="0"/>
+              <a:buChar char="•"/>
+              <a:defRPr sz="1800" kern="1200">
+                <a:solidFill>
+                  <a:schemeClr val="tx1"/>
+                </a:solidFill>
+                <a:latin typeface="+mn-lt"/>
+                <a:ea typeface="+mn-ea"/>
+                <a:cs typeface="+mn-cs"/>
+              </a:defRPr>
+            </a:lvl4pPr>
+            <a:lvl5pPr marL="2057400" indent="-228600" algn="l" defTabSz="914400" rtl="0" eaLnBrk="1" latinLnBrk="0" hangingPunct="1">
+              <a:lnSpc>
+                <a:spcPct val="90000"/>
+              </a:lnSpc>
+              <a:spcBef>
+                <a:spcPts val="500"/>
+              </a:spcBef>
+              <a:buFont typeface="Arial" panose="020B0604020202020204" pitchFamily="34" charset="0"/>
+              <a:buChar char="•"/>
+              <a:defRPr sz="1800" kern="1200">
+                <a:solidFill>
+                  <a:schemeClr val="tx1"/>
+                </a:solidFill>
+                <a:latin typeface="+mn-lt"/>
+                <a:ea typeface="+mn-ea"/>
+                <a:cs typeface="+mn-cs"/>
+              </a:defRPr>
+            </a:lvl5pPr>
+            <a:lvl6pPr marL="2514600" indent="-228600" algn="l" defTabSz="914400" rtl="0" eaLnBrk="1" latinLnBrk="0" hangingPunct="1">
+              <a:lnSpc>
+                <a:spcPct val="90000"/>
+              </a:lnSpc>
+              <a:spcBef>
+                <a:spcPts val="500"/>
+              </a:spcBef>
+              <a:buFont typeface="Arial" panose="020B0604020202020204" pitchFamily="34" charset="0"/>
+              <a:buChar char="•"/>
+              <a:defRPr sz="1800" kern="1200">
+                <a:solidFill>
+                  <a:schemeClr val="tx1"/>
+                </a:solidFill>
+                <a:latin typeface="+mn-lt"/>
+                <a:ea typeface="+mn-ea"/>
+                <a:cs typeface="+mn-cs"/>
+              </a:defRPr>
+            </a:lvl6pPr>
+            <a:lvl7pPr marL="2971800" indent="-228600" algn="l" defTabSz="914400" rtl="0" eaLnBrk="1" latinLnBrk="0" hangingPunct="1">
+              <a:lnSpc>
+                <a:spcPct val="90000"/>
+              </a:lnSpc>
+              <a:spcBef>
+                <a:spcPts val="500"/>
+              </a:spcBef>
+              <a:buFont typeface="Arial" panose="020B0604020202020204" pitchFamily="34" charset="0"/>
+              <a:buChar char="•"/>
+              <a:defRPr sz="1800" kern="1200">
+                <a:solidFill>
+                  <a:schemeClr val="tx1"/>
+                </a:solidFill>
+                <a:latin typeface="+mn-lt"/>
+                <a:ea typeface="+mn-ea"/>
+                <a:cs typeface="+mn-cs"/>
+              </a:defRPr>
+            </a:lvl7pPr>
+            <a:lvl8pPr marL="3429000" indent="-228600" algn="l" defTabSz="914400" rtl="0" eaLnBrk="1" latinLnBrk="0" hangingPunct="1">
+              <a:lnSpc>
+                <a:spcPct val="90000"/>
+              </a:lnSpc>
+              <a:spcBef>
+                <a:spcPts val="500"/>
+              </a:spcBef>
+              <a:buFont typeface="Arial" panose="020B0604020202020204" pitchFamily="34" charset="0"/>
+              <a:buChar char="•"/>
+              <a:defRPr sz="1800" kern="1200">
+                <a:solidFill>
+                  <a:schemeClr val="tx1"/>
+                </a:solidFill>
+                <a:latin typeface="+mn-lt"/>
+                <a:ea typeface="+mn-ea"/>
+                <a:cs typeface="+mn-cs"/>
+              </a:defRPr>
+            </a:lvl8pPr>
+            <a:lvl9pPr marL="3886200" indent="-228600" algn="l" defTabSz="914400" rtl="0" eaLnBrk="1" latinLnBrk="0" hangingPunct="1">
+              <a:lnSpc>
+                <a:spcPct val="90000"/>
+              </a:lnSpc>
+              <a:spcBef>
+                <a:spcPts val="500"/>
+              </a:spcBef>
+              <a:buFont typeface="Arial" panose="020B0604020202020204" pitchFamily="34" charset="0"/>
+              <a:buChar char="•"/>
+              <a:defRPr sz="1800" kern="1200">
+                <a:solidFill>
+                  <a:schemeClr val="tx1"/>
+                </a:solidFill>
+                <a:latin typeface="+mn-lt"/>
+                <a:ea typeface="+mn-ea"/>
+                <a:cs typeface="+mn-cs"/>
+              </a:defRPr>
+            </a:lvl9pPr>
+          </a:lstStyle>
+          <a:p>
+            <a:r>
+              <a:rPr lang="tr-TR" dirty="0"/>
+              <a:t>Sanal ortamı kaldırma: cd ile ml klasörü dışına geldikten sonra</a:t>
+            </a:r>
+          </a:p>
+          <a:p>
+            <a:pPr marL="0" indent="0">
+              <a:buFont typeface="Arial" panose="020B0604020202020204" pitchFamily="34" charset="0"/>
+              <a:buNone/>
+            </a:pPr>
+            <a:r>
+              <a:rPr lang="tr-TR" dirty="0">
+                <a:latin typeface="Consolas" panose="020B0609020204030204" pitchFamily="49" charset="0"/>
+              </a:rPr>
+              <a:t>	</a:t>
+            </a:r>
+            <a:r>
+              <a:rPr lang="tr-TR" dirty="0">
+                <a:solidFill>
+                  <a:srgbClr val="FF0000"/>
+                </a:solidFill>
+                <a:latin typeface="Consolas" panose="020B0609020204030204" pitchFamily="49" charset="0"/>
+              </a:rPr>
+              <a:t>&gt;cd ..</a:t>
+            </a:r>
+          </a:p>
+          <a:p>
+            <a:pPr marL="0" indent="0">
+              <a:buNone/>
+            </a:pPr>
+            <a:r>
+              <a:rPr lang="tr-TR" dirty="0">
+                <a:latin typeface="Consolas" panose="020B0609020204030204" pitchFamily="49" charset="0"/>
+              </a:rPr>
+              <a:t>	</a:t>
+            </a:r>
+            <a:r>
+              <a:rPr lang="tr-TR" dirty="0">
+                <a:solidFill>
+                  <a:srgbClr val="FF0000"/>
+                </a:solidFill>
+                <a:latin typeface="Consolas" panose="020B0609020204030204" pitchFamily="49" charset="0"/>
+              </a:rPr>
+              <a:t>&gt;cd ..</a:t>
+            </a:r>
+          </a:p>
+          <a:p>
+            <a:r>
+              <a:rPr lang="tr-TR" dirty="0"/>
+              <a:t>Silme</a:t>
+            </a:r>
+          </a:p>
+          <a:p>
+            <a:pPr marL="457200" lvl="1" indent="0">
+              <a:buNone/>
+            </a:pPr>
+            <a:r>
+              <a:rPr lang="tr-TR" dirty="0"/>
+              <a:t>	</a:t>
+            </a:r>
+            <a:r>
+              <a:rPr lang="tr-TR" sz="2800" dirty="0">
+                <a:solidFill>
+                  <a:srgbClr val="FF0000"/>
+                </a:solidFill>
+                <a:latin typeface="Consolas" panose="020B0609020204030204" pitchFamily="49" charset="0"/>
+              </a:rPr>
+              <a:t>&gt;</a:t>
+            </a:r>
+            <a:r>
+              <a:rPr lang="en-US" sz="2800" dirty="0">
+                <a:solidFill>
+                  <a:srgbClr val="FF0000"/>
+                </a:solidFill>
+                <a:latin typeface="Consolas" panose="020B0609020204030204" pitchFamily="49" charset="0"/>
+              </a:rPr>
+              <a:t>RD /S /Q "C:\Users\user\python_egitim\ml"</a:t>
+            </a:r>
+            <a:endParaRPr lang="tr-TR" sz="2800" dirty="0">
+              <a:solidFill>
+                <a:srgbClr val="FF0000"/>
+              </a:solidFill>
+              <a:latin typeface="Consolas" panose="020B0609020204030204" pitchFamily="49" charset="0"/>
+            </a:endParaRPr>
+          </a:p>
+          <a:p>
+            <a:pPr marL="457200" lvl="1" indent="0">
+              <a:buNone/>
+            </a:pPr>
+            <a:r>
+              <a:rPr lang="tr-TR" sz="2800" dirty="0">
+                <a:latin typeface="+mj-lt"/>
+              </a:rPr>
+              <a:t>	</a:t>
+            </a:r>
+            <a:endParaRPr lang="tr-TR" dirty="0">
+              <a:latin typeface="+mj-lt"/>
+            </a:endParaRPr>
+          </a:p>
+          <a:p>
+            <a:r>
+              <a:rPr lang="tr-TR" dirty="0"/>
+              <a:t>Kontrol</a:t>
+            </a:r>
+          </a:p>
+          <a:p>
+            <a:pPr marL="0" indent="0">
+              <a:buNone/>
+            </a:pPr>
+            <a:r>
+              <a:rPr lang="tr-TR" dirty="0"/>
+              <a:t>	</a:t>
+            </a:r>
+            <a:r>
+              <a:rPr lang="tr-TR" dirty="0">
+                <a:solidFill>
+                  <a:srgbClr val="FF0000"/>
+                </a:solidFill>
+                <a:latin typeface="Consolas" panose="020B0609020204030204" pitchFamily="49" charset="0"/>
+              </a:rPr>
+              <a:t> &gt;</a:t>
+            </a:r>
+            <a:r>
+              <a:rPr lang="tr-TR" dirty="0" err="1">
+                <a:solidFill>
+                  <a:srgbClr val="FF0000"/>
+                </a:solidFill>
+                <a:latin typeface="Consolas" panose="020B0609020204030204" pitchFamily="49" charset="0"/>
+              </a:rPr>
+              <a:t>dir</a:t>
+            </a:r>
+            <a:endParaRPr lang="tr-TR" dirty="0">
+              <a:solidFill>
+                <a:srgbClr val="FF0000"/>
+              </a:solidFill>
+              <a:latin typeface="Consolas" panose="020B0609020204030204" pitchFamily="49" charset="0"/>
+            </a:endParaRPr>
+          </a:p>
+          <a:p>
+            <a:pPr marL="0" indent="0">
+              <a:buNone/>
+            </a:pPr>
+            <a:r>
+              <a:rPr lang="tr-TR" dirty="0"/>
+              <a:t>Volume in </a:t>
+            </a:r>
+            <a:r>
+              <a:rPr lang="tr-TR" dirty="0" err="1"/>
+              <a:t>drive</a:t>
+            </a:r>
+            <a:r>
+              <a:rPr lang="tr-TR" dirty="0"/>
+              <a:t> C has </a:t>
+            </a:r>
+            <a:r>
+              <a:rPr lang="tr-TR" dirty="0" err="1"/>
+              <a:t>no</a:t>
+            </a:r>
+            <a:r>
+              <a:rPr lang="tr-TR" dirty="0"/>
+              <a:t> </a:t>
+            </a:r>
+            <a:r>
+              <a:rPr lang="tr-TR" dirty="0" err="1"/>
+              <a:t>label</a:t>
+            </a:r>
+            <a:r>
+              <a:rPr lang="tr-TR" dirty="0"/>
+              <a:t>.</a:t>
+            </a:r>
+          </a:p>
+          <a:p>
+            <a:pPr marL="0" indent="0">
+              <a:buNone/>
+            </a:pPr>
+            <a:r>
+              <a:rPr lang="tr-TR" dirty="0"/>
+              <a:t> Volume </a:t>
+            </a:r>
+            <a:r>
+              <a:rPr lang="tr-TR" dirty="0" err="1"/>
+              <a:t>Serial</a:t>
+            </a:r>
+            <a:r>
+              <a:rPr lang="tr-TR" dirty="0"/>
+              <a:t> </a:t>
+            </a:r>
+            <a:r>
+              <a:rPr lang="tr-TR" dirty="0" err="1"/>
+              <a:t>Number</a:t>
+            </a:r>
+            <a:r>
+              <a:rPr lang="tr-TR" dirty="0"/>
+              <a:t> is 55F6-35C4</a:t>
+            </a:r>
+          </a:p>
+          <a:p>
+            <a:pPr marL="0" indent="0">
+              <a:buNone/>
+            </a:pPr>
+            <a:endParaRPr lang="tr-TR" dirty="0"/>
+          </a:p>
+          <a:p>
+            <a:pPr marL="0" indent="0">
+              <a:buNone/>
+            </a:pPr>
+            <a:r>
+              <a:rPr lang="tr-TR" dirty="0"/>
+              <a:t> Directory of C:\Users\user\python_egitim</a:t>
+            </a:r>
+          </a:p>
+          <a:p>
+            <a:pPr marL="0" indent="0">
+              <a:buNone/>
+            </a:pPr>
+            <a:endParaRPr lang="tr-TR" dirty="0"/>
+          </a:p>
+          <a:p>
+            <a:pPr marL="0" indent="0">
+              <a:buNone/>
+            </a:pPr>
+            <a:r>
+              <a:rPr lang="tr-TR" dirty="0"/>
+              <a:t>01.10.2019  18:00    &lt;DIR&gt;          .</a:t>
+            </a:r>
+          </a:p>
+          <a:p>
+            <a:pPr marL="0" indent="0">
+              <a:buNone/>
+            </a:pPr>
+            <a:r>
+              <a:rPr lang="tr-TR" dirty="0"/>
+              <a:t>01.10.2019  18:00    &lt;DIR&gt;          ..</a:t>
+            </a:r>
+          </a:p>
+          <a:p>
+            <a:pPr marL="0" indent="0">
+              <a:buNone/>
+            </a:pPr>
+            <a:r>
+              <a:rPr lang="tr-TR" dirty="0"/>
+              <a:t>0 File(s)              0 </a:t>
+            </a:r>
+            <a:r>
+              <a:rPr lang="tr-TR" dirty="0" err="1"/>
+              <a:t>bytes</a:t>
+            </a:r>
+            <a:endParaRPr lang="tr-TR" dirty="0"/>
+          </a:p>
+        </p:txBody>
+      </p:sp>
+      <p:sp>
+        <p:nvSpPr>
+          <p:cNvPr id="7" name="Unvan 1">
+            <a:extLst>
+              <a:ext uri="{FF2B5EF4-FFF2-40B4-BE49-F238E27FC236}">
+                <a16:creationId xmlns:a16="http://schemas.microsoft.com/office/drawing/2014/main" id="{874704D3-D16C-4D8E-8384-BE18FA6F9380}"/>
+              </a:ext>
+            </a:extLst>
+          </p:cNvPr>
+          <p:cNvSpPr>
+            <a:spLocks noGrp="1"/>
+          </p:cNvSpPr>
+          <p:nvPr>
+            <p:ph type="title"/>
+          </p:nvPr>
+        </p:nvSpPr>
+        <p:spPr>
+          <a:xfrm>
+            <a:off x="838200" y="325398"/>
+            <a:ext cx="10515600" cy="722895"/>
+          </a:xfrm>
+        </p:spPr>
+        <p:txBody>
+          <a:bodyPr>
+            <a:normAutofit/>
+          </a:bodyPr>
+          <a:lstStyle/>
+          <a:p>
+            <a:pPr algn="ctr"/>
+            <a:r>
+              <a:rPr lang="en-US" sz="3800" b="1" dirty="0">
+                <a:solidFill>
+                  <a:srgbClr val="FF1F20"/>
+                </a:solidFill>
+                <a:latin typeface="Arial" panose="020B0604020202020204" pitchFamily="34" charset="0"/>
+                <a:ea typeface="Verdana" panose="020B0604030504040204" pitchFamily="34" charset="0"/>
+                <a:cs typeface="Arial" panose="020B0604020202020204" pitchFamily="34" charset="0"/>
+              </a:rPr>
+              <a:t>PYTHON </a:t>
+            </a:r>
+            <a:r>
+              <a:rPr lang="tr-TR" sz="3800" b="1" dirty="0">
+                <a:solidFill>
+                  <a:srgbClr val="FF1F20"/>
+                </a:solidFill>
+                <a:latin typeface="Arial" panose="020B0604020202020204" pitchFamily="34" charset="0"/>
+                <a:ea typeface="Verdana" panose="020B0604030504040204" pitchFamily="34" charset="0"/>
+                <a:cs typeface="Arial" panose="020B0604020202020204" pitchFamily="34" charset="0"/>
+              </a:rPr>
+              <a:t>VIRTUALENV</a:t>
+            </a:r>
+            <a:endParaRPr lang="en-US" sz="3800" b="1" dirty="0">
+              <a:solidFill>
+                <a:srgbClr val="FF1F20"/>
+              </a:solidFill>
+              <a:latin typeface="Arial" panose="020B0604020202020204" pitchFamily="34" charset="0"/>
+              <a:ea typeface="Verdana" panose="020B0604030504040204" pitchFamily="34" charset="0"/>
+              <a:cs typeface="Arial" panose="020B0604020202020204" pitchFamily="34" charset="0"/>
+            </a:endParaRPr>
+          </a:p>
+        </p:txBody>
+      </p:sp>
+    </p:spTree>
+    <p:extLst>
+      <p:ext uri="{BB962C8B-B14F-4D97-AF65-F5344CB8AC3E}">
+        <p14:creationId xmlns:p14="http://schemas.microsoft.com/office/powerpoint/2010/main" val="1079633397"/>
+      </p:ext>
+    </p:extLst>
+  </p:cSld>
+  <p:clrMapOvr>
+    <a:masterClrMapping/>
+  </p:clrMapOvr>
+</p:sld>
+</file>
+
 <file path=ppt/slides/slide2.xml><?xml version="1.0" encoding="utf-8"?>
 <p:sld xmlns:a="http://schemas.openxmlformats.org/drawingml/2006/main" xmlns:r="http://schemas.openxmlformats.org/officeDocument/2006/relationships" xmlns:p="http://schemas.openxmlformats.org/presentationml/2006/main">
   <p:cSld>
@@ -3482,7 +4876,12 @@
             <p:ph idx="1"/>
           </p:nvPr>
         </p:nvSpPr>
-        <p:spPr/>
+        <p:spPr>
+          <a:xfrm>
+            <a:off x="838200" y="2543255"/>
+            <a:ext cx="10515600" cy="2804248"/>
+          </a:xfrm>
+        </p:spPr>
         <p:txBody>
           <a:bodyPr/>
           <a:lstStyle/>
@@ -3706,6 +5105,9 @@
             </a:r>
           </a:p>
           <a:p>
+            <a:pPr marL="0" indent="0">
+              <a:buNone/>
+            </a:pPr>
             <a:endParaRPr lang="en-US" dirty="0"/>
           </a:p>
         </p:txBody>
@@ -3714,6 +5116,2858 @@
     <p:extLst>
       <p:ext uri="{BB962C8B-B14F-4D97-AF65-F5344CB8AC3E}">
         <p14:creationId xmlns:p14="http://schemas.microsoft.com/office/powerpoint/2010/main" val="1410318713"/>
+      </p:ext>
+    </p:extLst>
+  </p:cSld>
+  <p:clrMapOvr>
+    <a:masterClrMapping/>
+  </p:clrMapOvr>
+</p:sld>
+</file>
+
+<file path=ppt/slides/slide3.xml><?xml version="1.0" encoding="utf-8"?>
+<p:sld xmlns:a="http://schemas.openxmlformats.org/drawingml/2006/main" xmlns:r="http://schemas.openxmlformats.org/officeDocument/2006/relationships" xmlns:p="http://schemas.openxmlformats.org/presentationml/2006/main">
+  <p:cSld>
+    <p:spTree>
+      <p:nvGrpSpPr>
+        <p:cNvPr id="1" name=""/>
+        <p:cNvGrpSpPr/>
+        <p:nvPr/>
+      </p:nvGrpSpPr>
+      <p:grpSpPr>
+        <a:xfrm>
+          <a:off x="0" y="0"/>
+          <a:ext cx="0" cy="0"/>
+          <a:chOff x="0" y="0"/>
+          <a:chExt cx="0" cy="0"/>
+        </a:xfrm>
+      </p:grpSpPr>
+      <p:sp>
+        <p:nvSpPr>
+          <p:cNvPr id="3" name="İçerik Yer Tutucusu 2">
+            <a:extLst>
+              <a:ext uri="{FF2B5EF4-FFF2-40B4-BE49-F238E27FC236}">
+                <a16:creationId xmlns:a16="http://schemas.microsoft.com/office/drawing/2014/main" id="{78143FBE-F5B7-47F5-9EED-32A2F1831001}"/>
+              </a:ext>
+            </a:extLst>
+          </p:cNvPr>
+          <p:cNvSpPr>
+            <a:spLocks noGrp="1"/>
+          </p:cNvSpPr>
+          <p:nvPr>
+            <p:ph idx="1"/>
+          </p:nvPr>
+        </p:nvSpPr>
+        <p:spPr>
+          <a:xfrm>
+            <a:off x="502534" y="957524"/>
+            <a:ext cx="10515600" cy="5582172"/>
+          </a:xfrm>
+        </p:spPr>
+        <p:txBody>
+          <a:bodyPr>
+            <a:normAutofit/>
+          </a:bodyPr>
+          <a:lstStyle/>
+          <a:p>
+            <a:r>
+              <a:rPr lang="tr-TR" dirty="0">
+                <a:hlinkClick r:id="rId2"/>
+              </a:rPr>
+              <a:t>https://www.python.org/downloads/release/python-365/</a:t>
+            </a:r>
+            <a:endParaRPr lang="tr-TR" dirty="0"/>
+          </a:p>
+          <a:p>
+            <a:pPr marL="0" indent="0">
+              <a:buNone/>
+            </a:pPr>
+            <a:r>
+              <a:rPr lang="tr-TR" dirty="0"/>
+              <a:t>adresinden  "Windows x86-64 </a:t>
+            </a:r>
+            <a:r>
+              <a:rPr lang="tr-TR" dirty="0" err="1"/>
+              <a:t>executable</a:t>
+            </a:r>
+            <a:r>
+              <a:rPr lang="tr-TR" dirty="0"/>
+              <a:t> </a:t>
+            </a:r>
+            <a:r>
+              <a:rPr lang="tr-TR" dirty="0" err="1"/>
+              <a:t>installer</a:t>
+            </a:r>
+            <a:r>
+              <a:rPr lang="tr-TR" dirty="0"/>
+              <a:t>"</a:t>
+            </a:r>
+          </a:p>
+          <a:p>
+            <a:pPr marL="0" indent="0">
+              <a:buNone/>
+            </a:pPr>
+            <a:r>
+              <a:rPr lang="tr-TR" dirty="0"/>
+              <a:t>indirip kuruluma başlayalım.</a:t>
+            </a:r>
+          </a:p>
+          <a:p>
+            <a:r>
+              <a:rPr lang="tr-TR" dirty="0"/>
+              <a:t>Kurulum esnasında </a:t>
+            </a:r>
+            <a:r>
+              <a:rPr lang="tr-TR" dirty="0" err="1"/>
+              <a:t>PATH'e</a:t>
+            </a:r>
+            <a:r>
+              <a:rPr lang="tr-TR" dirty="0"/>
+              <a:t> ekle seçeneğini seçelim.</a:t>
+            </a:r>
+          </a:p>
+          <a:p>
+            <a:endParaRPr lang="tr-TR" dirty="0"/>
+          </a:p>
+          <a:p>
+            <a:r>
+              <a:rPr lang="en-US" dirty="0"/>
+              <a:t>3. </a:t>
+            </a:r>
+            <a:r>
+              <a:rPr lang="en-US" dirty="0" err="1"/>
+              <a:t>Kurulum</a:t>
+            </a:r>
+            <a:r>
+              <a:rPr lang="en-US" dirty="0"/>
+              <a:t> </a:t>
+            </a:r>
+            <a:r>
+              <a:rPr lang="en-US" dirty="0" err="1"/>
+              <a:t>sonrası</a:t>
+            </a:r>
+            <a:r>
+              <a:rPr lang="en-US" dirty="0"/>
+              <a:t> python </a:t>
+            </a:r>
+            <a:r>
+              <a:rPr lang="en-US" dirty="0" err="1"/>
+              <a:t>ve</a:t>
+            </a:r>
+            <a:r>
+              <a:rPr lang="en-US" dirty="0"/>
+              <a:t> pip </a:t>
+            </a:r>
+            <a:r>
+              <a:rPr lang="en-US" dirty="0" err="1"/>
+              <a:t>kontrol</a:t>
+            </a:r>
+            <a:r>
+              <a:rPr lang="en-US" dirty="0"/>
+              <a:t>:</a:t>
+            </a:r>
+          </a:p>
+          <a:p>
+            <a:pPr marL="0" indent="0">
+              <a:buNone/>
+            </a:pPr>
+            <a:r>
+              <a:rPr lang="tr-TR" dirty="0"/>
+              <a:t>	</a:t>
+            </a:r>
+            <a:r>
+              <a:rPr lang="tr-TR" dirty="0">
+                <a:solidFill>
+                  <a:srgbClr val="FF0000"/>
+                </a:solidFill>
+                <a:latin typeface="Consolas" panose="020B0609020204030204" pitchFamily="49" charset="0"/>
+              </a:rPr>
+              <a:t>&gt;</a:t>
+            </a:r>
+            <a:r>
+              <a:rPr lang="en-US" dirty="0">
+                <a:solidFill>
+                  <a:srgbClr val="FF0000"/>
+                </a:solidFill>
+                <a:latin typeface="Consolas" panose="020B0609020204030204" pitchFamily="49" charset="0"/>
+              </a:rPr>
+              <a:t>where python</a:t>
+            </a:r>
+          </a:p>
+          <a:p>
+            <a:pPr marL="0" indent="0">
+              <a:buNone/>
+            </a:pPr>
+            <a:r>
+              <a:rPr lang="en-US" dirty="0"/>
+              <a:t>	</a:t>
+            </a:r>
+          </a:p>
+          <a:p>
+            <a:pPr marL="0" indent="0">
+              <a:buNone/>
+            </a:pPr>
+            <a:r>
+              <a:rPr lang="en-US" dirty="0"/>
+              <a:t>	</a:t>
+            </a:r>
+            <a:r>
+              <a:rPr lang="en-US" dirty="0" err="1"/>
+              <a:t>Çıktı</a:t>
+            </a:r>
+            <a:r>
+              <a:rPr lang="en-US" dirty="0"/>
+              <a:t>:</a:t>
+            </a:r>
+          </a:p>
+          <a:p>
+            <a:pPr marL="0" indent="0">
+              <a:buNone/>
+            </a:pPr>
+            <a:r>
+              <a:rPr lang="tr-TR" dirty="0"/>
+              <a:t> 	</a:t>
+            </a:r>
+            <a:r>
+              <a:rPr lang="tr-TR" dirty="0">
+                <a:latin typeface="Consolas" panose="020B0609020204030204" pitchFamily="49" charset="0"/>
+              </a:rPr>
+              <a:t>&gt;</a:t>
+            </a:r>
+            <a:r>
+              <a:rPr lang="en-US" dirty="0">
+                <a:latin typeface="Consolas" panose="020B0609020204030204" pitchFamily="49" charset="0"/>
+              </a:rPr>
+              <a:t>C:\Python\Python36\python.exe</a:t>
+            </a:r>
+          </a:p>
+          <a:p>
+            <a:endParaRPr lang="en-US" dirty="0"/>
+          </a:p>
+        </p:txBody>
+      </p:sp>
+      <p:sp>
+        <p:nvSpPr>
+          <p:cNvPr id="9" name="Unvan 1">
+            <a:extLst>
+              <a:ext uri="{FF2B5EF4-FFF2-40B4-BE49-F238E27FC236}">
+                <a16:creationId xmlns:a16="http://schemas.microsoft.com/office/drawing/2014/main" id="{8E963289-B78E-4DA8-BA22-13B4931BCF5C}"/>
+              </a:ext>
+            </a:extLst>
+          </p:cNvPr>
+          <p:cNvSpPr>
+            <a:spLocks noGrp="1"/>
+          </p:cNvSpPr>
+          <p:nvPr>
+            <p:ph type="title"/>
+          </p:nvPr>
+        </p:nvSpPr>
+        <p:spPr>
+          <a:xfrm>
+            <a:off x="757177" y="277793"/>
+            <a:ext cx="10515600" cy="592399"/>
+          </a:xfrm>
+        </p:spPr>
+        <p:txBody>
+          <a:bodyPr>
+            <a:normAutofit fontScale="90000"/>
+          </a:bodyPr>
+          <a:lstStyle/>
+          <a:p>
+            <a:pPr algn="ctr"/>
+            <a:r>
+              <a:rPr lang="en-US" sz="3800" b="1" dirty="0">
+                <a:solidFill>
+                  <a:srgbClr val="FF1F20"/>
+                </a:solidFill>
+                <a:latin typeface="Arial" panose="020B0604020202020204" pitchFamily="34" charset="0"/>
+                <a:ea typeface="Verdana" panose="020B0604030504040204" pitchFamily="34" charset="0"/>
+                <a:cs typeface="Arial" panose="020B0604020202020204" pitchFamily="34" charset="0"/>
+              </a:rPr>
+              <a:t>PYTHON </a:t>
+            </a:r>
+            <a:r>
+              <a:rPr lang="tr-TR" sz="3800" b="1" dirty="0">
+                <a:solidFill>
+                  <a:srgbClr val="FF1F20"/>
+                </a:solidFill>
+                <a:latin typeface="Arial" panose="020B0604020202020204" pitchFamily="34" charset="0"/>
+                <a:ea typeface="Verdana" panose="020B0604030504040204" pitchFamily="34" charset="0"/>
+                <a:cs typeface="Arial" panose="020B0604020202020204" pitchFamily="34" charset="0"/>
+              </a:rPr>
+              <a:t>KURULUM</a:t>
+            </a:r>
+            <a:endParaRPr lang="en-US" sz="3800" b="1" dirty="0">
+              <a:solidFill>
+                <a:srgbClr val="FF1F20"/>
+              </a:solidFill>
+              <a:latin typeface="Arial" panose="020B0604020202020204" pitchFamily="34" charset="0"/>
+              <a:ea typeface="Verdana" panose="020B0604030504040204" pitchFamily="34" charset="0"/>
+              <a:cs typeface="Arial" panose="020B0604020202020204" pitchFamily="34" charset="0"/>
+            </a:endParaRPr>
+          </a:p>
+        </p:txBody>
+      </p:sp>
+    </p:spTree>
+    <p:extLst>
+      <p:ext uri="{BB962C8B-B14F-4D97-AF65-F5344CB8AC3E}">
+        <p14:creationId xmlns:p14="http://schemas.microsoft.com/office/powerpoint/2010/main" val="2302032262"/>
+      </p:ext>
+    </p:extLst>
+  </p:cSld>
+  <p:clrMapOvr>
+    <a:masterClrMapping/>
+  </p:clrMapOvr>
+</p:sld>
+</file>
+
+<file path=ppt/slides/slide4.xml><?xml version="1.0" encoding="utf-8"?>
+<p:sld xmlns:a="http://schemas.openxmlformats.org/drawingml/2006/main" xmlns:r="http://schemas.openxmlformats.org/officeDocument/2006/relationships" xmlns:p="http://schemas.openxmlformats.org/presentationml/2006/main">
+  <p:cSld>
+    <p:spTree>
+      <p:nvGrpSpPr>
+        <p:cNvPr id="1" name=""/>
+        <p:cNvGrpSpPr/>
+        <p:nvPr/>
+      </p:nvGrpSpPr>
+      <p:grpSpPr>
+        <a:xfrm>
+          <a:off x="0" y="0"/>
+          <a:ext cx="0" cy="0"/>
+          <a:chOff x="0" y="0"/>
+          <a:chExt cx="0" cy="0"/>
+        </a:xfrm>
+      </p:grpSpPr>
+      <p:sp>
+        <p:nvSpPr>
+          <p:cNvPr id="3" name="İçerik Yer Tutucusu 2">
+            <a:extLst>
+              <a:ext uri="{FF2B5EF4-FFF2-40B4-BE49-F238E27FC236}">
+                <a16:creationId xmlns:a16="http://schemas.microsoft.com/office/drawing/2014/main" id="{78143FBE-F5B7-47F5-9EED-32A2F1831001}"/>
+              </a:ext>
+            </a:extLst>
+          </p:cNvPr>
+          <p:cNvSpPr>
+            <a:spLocks noGrp="1"/>
+          </p:cNvSpPr>
+          <p:nvPr>
+            <p:ph idx="1"/>
+          </p:nvPr>
+        </p:nvSpPr>
+        <p:spPr>
+          <a:xfrm>
+            <a:off x="502534" y="911226"/>
+            <a:ext cx="10515600" cy="5582172"/>
+          </a:xfrm>
+        </p:spPr>
+        <p:txBody>
+          <a:bodyPr>
+            <a:normAutofit/>
+          </a:bodyPr>
+          <a:lstStyle/>
+          <a:p>
+            <a:r>
+              <a:rPr lang="tr-TR" dirty="0"/>
+              <a:t>Python versiyon kontrolü</a:t>
+            </a:r>
+          </a:p>
+          <a:p>
+            <a:pPr marL="0" indent="0">
+              <a:buNone/>
+            </a:pPr>
+            <a:r>
+              <a:rPr lang="tr-TR" dirty="0">
+                <a:latin typeface="Consolas" panose="020B0609020204030204" pitchFamily="49" charset="0"/>
+              </a:rPr>
+              <a:t> 	</a:t>
+            </a:r>
+            <a:r>
+              <a:rPr lang="tr-TR" dirty="0">
+                <a:solidFill>
+                  <a:srgbClr val="FF0000"/>
+                </a:solidFill>
+                <a:latin typeface="Consolas" panose="020B0609020204030204" pitchFamily="49" charset="0"/>
+              </a:rPr>
+              <a:t>&gt;</a:t>
+            </a:r>
+            <a:r>
+              <a:rPr lang="en-US" dirty="0">
+                <a:solidFill>
+                  <a:srgbClr val="FF0000"/>
+                </a:solidFill>
+                <a:latin typeface="Consolas" panose="020B0609020204030204" pitchFamily="49" charset="0"/>
+              </a:rPr>
+              <a:t>python -V</a:t>
+            </a:r>
+          </a:p>
+          <a:p>
+            <a:pPr marL="0" indent="0">
+              <a:buNone/>
+            </a:pPr>
+            <a:r>
+              <a:rPr lang="tr-TR" dirty="0">
+                <a:latin typeface="Consolas" panose="020B0609020204030204" pitchFamily="49" charset="0"/>
+              </a:rPr>
+              <a:t>	</a:t>
+            </a:r>
+            <a:r>
+              <a:rPr lang="en-US" dirty="0" err="1">
+                <a:latin typeface="Consolas" panose="020B0609020204030204" pitchFamily="49" charset="0"/>
+              </a:rPr>
+              <a:t>Çıktı</a:t>
+            </a:r>
+            <a:r>
+              <a:rPr lang="en-US" dirty="0">
+                <a:latin typeface="Consolas" panose="020B0609020204030204" pitchFamily="49" charset="0"/>
+              </a:rPr>
+              <a:t>:</a:t>
+            </a:r>
+          </a:p>
+          <a:p>
+            <a:pPr marL="0" indent="0">
+              <a:buNone/>
+            </a:pPr>
+            <a:r>
+              <a:rPr lang="tr-TR" dirty="0">
+                <a:latin typeface="Consolas" panose="020B0609020204030204" pitchFamily="49" charset="0"/>
+              </a:rPr>
+              <a:t>	</a:t>
+            </a:r>
+            <a:r>
+              <a:rPr lang="en-US" dirty="0">
+                <a:latin typeface="Consolas" panose="020B0609020204030204" pitchFamily="49" charset="0"/>
+              </a:rPr>
+              <a:t>Python 3.6.5</a:t>
+            </a:r>
+            <a:endParaRPr lang="tr-TR" dirty="0">
+              <a:latin typeface="Consolas" panose="020B0609020204030204" pitchFamily="49" charset="0"/>
+            </a:endParaRPr>
+          </a:p>
+          <a:p>
+            <a:pPr marL="0" indent="0">
+              <a:buNone/>
+            </a:pPr>
+            <a:endParaRPr lang="en-US" dirty="0">
+              <a:latin typeface="Consolas" panose="020B0609020204030204" pitchFamily="49" charset="0"/>
+            </a:endParaRPr>
+          </a:p>
+          <a:p>
+            <a:r>
+              <a:rPr lang="tr-TR" dirty="0"/>
+              <a:t>Pip versiyon kontrolü</a:t>
+            </a:r>
+          </a:p>
+          <a:p>
+            <a:pPr marL="0" indent="0">
+              <a:buNone/>
+            </a:pPr>
+            <a:r>
+              <a:rPr lang="tr-TR" dirty="0"/>
+              <a:t>	</a:t>
+            </a:r>
+            <a:r>
+              <a:rPr lang="tr-TR" dirty="0">
+                <a:solidFill>
+                  <a:srgbClr val="FF0000"/>
+                </a:solidFill>
+                <a:latin typeface="Consolas" panose="020B0609020204030204" pitchFamily="49" charset="0"/>
+              </a:rPr>
+              <a:t>&gt;</a:t>
+            </a:r>
+            <a:r>
+              <a:rPr lang="en-US" dirty="0">
+                <a:solidFill>
+                  <a:srgbClr val="FF0000"/>
+                </a:solidFill>
+                <a:latin typeface="Consolas" panose="020B0609020204030204" pitchFamily="49" charset="0"/>
+              </a:rPr>
+              <a:t>pip -V</a:t>
+            </a:r>
+            <a:endParaRPr lang="en-US" dirty="0">
+              <a:solidFill>
+                <a:srgbClr val="FF0000"/>
+              </a:solidFill>
+            </a:endParaRPr>
+          </a:p>
+          <a:p>
+            <a:pPr marL="0" indent="0">
+              <a:buNone/>
+            </a:pPr>
+            <a:r>
+              <a:rPr lang="tr-TR" dirty="0"/>
+              <a:t>	</a:t>
+            </a:r>
+            <a:r>
+              <a:rPr lang="en-US" dirty="0" err="1"/>
+              <a:t>Çıktı</a:t>
+            </a:r>
+            <a:r>
+              <a:rPr lang="en-US" dirty="0"/>
+              <a:t>:</a:t>
+            </a:r>
+          </a:p>
+          <a:p>
+            <a:pPr marL="0" indent="0">
+              <a:buNone/>
+            </a:pPr>
+            <a:r>
+              <a:rPr lang="tr-TR" dirty="0"/>
+              <a:t>	</a:t>
+            </a:r>
+            <a:r>
+              <a:rPr lang="en-US" dirty="0">
+                <a:latin typeface="Consolas" panose="020B0609020204030204" pitchFamily="49" charset="0"/>
+              </a:rPr>
+              <a:t>pip 9.0.3 from c:\python\python36\lib\site-</a:t>
+            </a:r>
+            <a:r>
+              <a:rPr lang="tr-TR" dirty="0">
+                <a:latin typeface="Consolas" panose="020B0609020204030204" pitchFamily="49" charset="0"/>
+              </a:rPr>
+              <a:t>	</a:t>
+            </a:r>
+            <a:r>
+              <a:rPr lang="en-US" dirty="0">
+                <a:latin typeface="Consolas" panose="020B0609020204030204" pitchFamily="49" charset="0"/>
+              </a:rPr>
+              <a:t>packages (python 3.6)</a:t>
+            </a:r>
+          </a:p>
+        </p:txBody>
+      </p:sp>
+      <p:sp>
+        <p:nvSpPr>
+          <p:cNvPr id="5" name="Unvan 1">
+            <a:extLst>
+              <a:ext uri="{FF2B5EF4-FFF2-40B4-BE49-F238E27FC236}">
+                <a16:creationId xmlns:a16="http://schemas.microsoft.com/office/drawing/2014/main" id="{CF81A58D-EA24-4D49-8EE7-8F65EF27816A}"/>
+              </a:ext>
+            </a:extLst>
+          </p:cNvPr>
+          <p:cNvSpPr>
+            <a:spLocks noGrp="1"/>
+          </p:cNvSpPr>
+          <p:nvPr>
+            <p:ph type="title"/>
+          </p:nvPr>
+        </p:nvSpPr>
+        <p:spPr>
+          <a:xfrm>
+            <a:off x="757177" y="277793"/>
+            <a:ext cx="10515600" cy="592399"/>
+          </a:xfrm>
+        </p:spPr>
+        <p:txBody>
+          <a:bodyPr>
+            <a:normAutofit fontScale="90000"/>
+          </a:bodyPr>
+          <a:lstStyle/>
+          <a:p>
+            <a:pPr algn="ctr"/>
+            <a:r>
+              <a:rPr lang="en-US" sz="3800" b="1" dirty="0">
+                <a:solidFill>
+                  <a:srgbClr val="FF1F20"/>
+                </a:solidFill>
+                <a:latin typeface="Arial" panose="020B0604020202020204" pitchFamily="34" charset="0"/>
+                <a:ea typeface="Verdana" panose="020B0604030504040204" pitchFamily="34" charset="0"/>
+                <a:cs typeface="Arial" panose="020B0604020202020204" pitchFamily="34" charset="0"/>
+              </a:rPr>
+              <a:t>PYTHON </a:t>
+            </a:r>
+            <a:r>
+              <a:rPr lang="tr-TR" sz="3800" b="1" dirty="0">
+                <a:solidFill>
+                  <a:srgbClr val="FF1F20"/>
+                </a:solidFill>
+                <a:latin typeface="Arial" panose="020B0604020202020204" pitchFamily="34" charset="0"/>
+                <a:ea typeface="Verdana" panose="020B0604030504040204" pitchFamily="34" charset="0"/>
+                <a:cs typeface="Arial" panose="020B0604020202020204" pitchFamily="34" charset="0"/>
+              </a:rPr>
+              <a:t>ve PIP KONTROL</a:t>
+            </a:r>
+            <a:endParaRPr lang="en-US" sz="3800" b="1" dirty="0">
+              <a:solidFill>
+                <a:srgbClr val="FF1F20"/>
+              </a:solidFill>
+              <a:latin typeface="Arial" panose="020B0604020202020204" pitchFamily="34" charset="0"/>
+              <a:ea typeface="Verdana" panose="020B0604030504040204" pitchFamily="34" charset="0"/>
+              <a:cs typeface="Arial" panose="020B0604020202020204" pitchFamily="34" charset="0"/>
+            </a:endParaRPr>
+          </a:p>
+        </p:txBody>
+      </p:sp>
+    </p:spTree>
+    <p:extLst>
+      <p:ext uri="{BB962C8B-B14F-4D97-AF65-F5344CB8AC3E}">
+        <p14:creationId xmlns:p14="http://schemas.microsoft.com/office/powerpoint/2010/main" val="2169297702"/>
+      </p:ext>
+    </p:extLst>
+  </p:cSld>
+  <p:clrMapOvr>
+    <a:masterClrMapping/>
+  </p:clrMapOvr>
+</p:sld>
+</file>
+
+<file path=ppt/slides/slide5.xml><?xml version="1.0" encoding="utf-8"?>
+<p:sld xmlns:a="http://schemas.openxmlformats.org/drawingml/2006/main" xmlns:r="http://schemas.openxmlformats.org/officeDocument/2006/relationships" xmlns:p="http://schemas.openxmlformats.org/presentationml/2006/main">
+  <p:cSld>
+    <p:spTree>
+      <p:nvGrpSpPr>
+        <p:cNvPr id="1" name=""/>
+        <p:cNvGrpSpPr/>
+        <p:nvPr/>
+      </p:nvGrpSpPr>
+      <p:grpSpPr>
+        <a:xfrm>
+          <a:off x="0" y="0"/>
+          <a:ext cx="0" cy="0"/>
+          <a:chOff x="0" y="0"/>
+          <a:chExt cx="0" cy="0"/>
+        </a:xfrm>
+      </p:grpSpPr>
+      <p:sp>
+        <p:nvSpPr>
+          <p:cNvPr id="3" name="İçerik Yer Tutucusu 2">
+            <a:extLst>
+              <a:ext uri="{FF2B5EF4-FFF2-40B4-BE49-F238E27FC236}">
+                <a16:creationId xmlns:a16="http://schemas.microsoft.com/office/drawing/2014/main" id="{78143FBE-F5B7-47F5-9EED-32A2F1831001}"/>
+              </a:ext>
+            </a:extLst>
+          </p:cNvPr>
+          <p:cNvSpPr>
+            <a:spLocks noGrp="1"/>
+          </p:cNvSpPr>
+          <p:nvPr>
+            <p:ph idx="1"/>
+          </p:nvPr>
+        </p:nvSpPr>
+        <p:spPr>
+          <a:xfrm>
+            <a:off x="525683" y="888075"/>
+            <a:ext cx="10515600" cy="5582172"/>
+          </a:xfrm>
+        </p:spPr>
+        <p:txBody>
+          <a:bodyPr>
+            <a:normAutofit fontScale="85000" lnSpcReduction="20000"/>
+          </a:bodyPr>
+          <a:lstStyle/>
+          <a:p>
+            <a:r>
+              <a:rPr lang="tr-TR" dirty="0"/>
+              <a:t>Pip Upgrade</a:t>
+            </a:r>
+          </a:p>
+          <a:p>
+            <a:pPr marL="0" indent="0">
+              <a:buNone/>
+            </a:pPr>
+            <a:r>
+              <a:rPr lang="tr-TR" dirty="0">
+                <a:latin typeface="Consolas" panose="020B0609020204030204" pitchFamily="49" charset="0"/>
+              </a:rPr>
+              <a:t> 	</a:t>
+            </a:r>
+            <a:r>
+              <a:rPr lang="tr-TR" dirty="0">
+                <a:solidFill>
+                  <a:srgbClr val="FF0000"/>
+                </a:solidFill>
+                <a:latin typeface="Consolas" panose="020B0609020204030204" pitchFamily="49" charset="0"/>
+              </a:rPr>
+              <a:t>&gt;</a:t>
+            </a:r>
+            <a:r>
+              <a:rPr lang="sv-SE" dirty="0">
+                <a:solidFill>
+                  <a:srgbClr val="FF0000"/>
+                </a:solidFill>
+                <a:latin typeface="Consolas" panose="020B0609020204030204" pitchFamily="49" charset="0"/>
+              </a:rPr>
+              <a:t>python -m pip install --upgrade pip</a:t>
+            </a:r>
+            <a:endParaRPr lang="en-US" dirty="0">
+              <a:solidFill>
+                <a:srgbClr val="FF0000"/>
+              </a:solidFill>
+              <a:latin typeface="Consolas" panose="020B0609020204030204" pitchFamily="49" charset="0"/>
+            </a:endParaRPr>
+          </a:p>
+          <a:p>
+            <a:pPr marL="0" indent="0">
+              <a:buNone/>
+            </a:pPr>
+            <a:r>
+              <a:rPr lang="tr-TR" dirty="0">
+                <a:latin typeface="Consolas" panose="020B0609020204030204" pitchFamily="49" charset="0"/>
+              </a:rPr>
+              <a:t>	</a:t>
+            </a:r>
+            <a:endParaRPr lang="en-US" dirty="0">
+              <a:latin typeface="Consolas" panose="020B0609020204030204" pitchFamily="49" charset="0"/>
+            </a:endParaRPr>
+          </a:p>
+          <a:p>
+            <a:r>
+              <a:rPr lang="tr-TR" dirty="0"/>
+              <a:t>Temel paketlerin kurulumu (</a:t>
+            </a:r>
+            <a:r>
+              <a:rPr lang="tr-TR" dirty="0" err="1"/>
+              <a:t>virtualenv</a:t>
+            </a:r>
+            <a:r>
+              <a:rPr lang="tr-TR" dirty="0"/>
+              <a:t> kullanılmayacak ise)</a:t>
+            </a:r>
+          </a:p>
+          <a:p>
+            <a:pPr marL="0" indent="0">
+              <a:buNone/>
+            </a:pPr>
+            <a:r>
+              <a:rPr lang="tr-TR" dirty="0"/>
+              <a:t>	</a:t>
+            </a:r>
+            <a:r>
+              <a:rPr lang="tr-TR" dirty="0">
+                <a:solidFill>
+                  <a:srgbClr val="FF0000"/>
+                </a:solidFill>
+                <a:latin typeface="Consolas" panose="020B0609020204030204" pitchFamily="49" charset="0"/>
+              </a:rPr>
+              <a:t>&gt;</a:t>
+            </a:r>
+            <a:r>
+              <a:rPr lang="en-US" dirty="0">
+                <a:solidFill>
+                  <a:srgbClr val="FF0000"/>
+                </a:solidFill>
+                <a:latin typeface="Consolas" panose="020B0609020204030204" pitchFamily="49" charset="0"/>
+              </a:rPr>
+              <a:t>python -m pip install pandas </a:t>
+            </a:r>
+            <a:r>
+              <a:rPr lang="en-US" dirty="0" err="1">
+                <a:solidFill>
+                  <a:srgbClr val="FF0000"/>
+                </a:solidFill>
+                <a:latin typeface="Consolas" panose="020B0609020204030204" pitchFamily="49" charset="0"/>
+              </a:rPr>
+              <a:t>sklearn</a:t>
+            </a:r>
+            <a:r>
+              <a:rPr lang="en-US" dirty="0">
+                <a:solidFill>
+                  <a:srgbClr val="FF0000"/>
+                </a:solidFill>
+                <a:latin typeface="Consolas" panose="020B0609020204030204" pitchFamily="49" charset="0"/>
+              </a:rPr>
+              <a:t> matplotlib seaborn </a:t>
+            </a:r>
+            <a:r>
+              <a:rPr lang="en-US" dirty="0" err="1">
+                <a:solidFill>
+                  <a:srgbClr val="FF0000"/>
+                </a:solidFill>
+                <a:latin typeface="Consolas" panose="020B0609020204030204" pitchFamily="49" charset="0"/>
+              </a:rPr>
+              <a:t>plotly</a:t>
+            </a:r>
+            <a:r>
+              <a:rPr lang="en-US" dirty="0">
+                <a:solidFill>
+                  <a:srgbClr val="FF0000"/>
+                </a:solidFill>
+                <a:latin typeface="Consolas" panose="020B0609020204030204" pitchFamily="49" charset="0"/>
+              </a:rPr>
+              <a:t> jupyter</a:t>
+            </a:r>
+            <a:endParaRPr lang="en-US" dirty="0">
+              <a:solidFill>
+                <a:srgbClr val="FF0000"/>
+              </a:solidFill>
+            </a:endParaRPr>
+          </a:p>
+          <a:p>
+            <a:pPr marL="0" indent="0">
+              <a:buNone/>
+            </a:pPr>
+            <a:endParaRPr lang="tr-TR" dirty="0">
+              <a:latin typeface="Consolas" panose="020B0609020204030204" pitchFamily="49" charset="0"/>
+            </a:endParaRPr>
+          </a:p>
+          <a:p>
+            <a:r>
+              <a:rPr lang="tr-TR" dirty="0"/>
+              <a:t>Jupyter çalıştırma</a:t>
+            </a:r>
+          </a:p>
+          <a:p>
+            <a:r>
+              <a:rPr lang="en-US" dirty="0"/>
+              <a:t>Windows </a:t>
+            </a:r>
+            <a:r>
+              <a:rPr lang="en-US" dirty="0" err="1"/>
+              <a:t>cmd</a:t>
+            </a:r>
+            <a:r>
+              <a:rPr lang="en-US" dirty="0"/>
+              <a:t> </a:t>
+            </a:r>
+            <a:r>
+              <a:rPr lang="en-US" dirty="0" err="1"/>
+              <a:t>açılır</a:t>
+            </a:r>
+            <a:r>
+              <a:rPr lang="en-US" dirty="0"/>
+              <a:t> (D </a:t>
+            </a:r>
+            <a:r>
+              <a:rPr lang="en-US" dirty="0" err="1"/>
+              <a:t>dizini</a:t>
+            </a:r>
+            <a:r>
+              <a:rPr lang="en-US" dirty="0"/>
+              <a:t> </a:t>
+            </a:r>
+            <a:r>
+              <a:rPr lang="en-US" dirty="0" err="1"/>
+              <a:t>içinde</a:t>
+            </a:r>
+            <a:r>
+              <a:rPr lang="en-US" dirty="0"/>
+              <a:t> jupyter </a:t>
+            </a:r>
+            <a:r>
+              <a:rPr lang="en-US" dirty="0" err="1"/>
+              <a:t>kullanmak</a:t>
+            </a:r>
+            <a:r>
+              <a:rPr lang="en-US" dirty="0"/>
+              <a:t> </a:t>
+            </a:r>
+            <a:r>
+              <a:rPr lang="en-US" dirty="0" err="1"/>
+              <a:t>istiyor</a:t>
+            </a:r>
+            <a:r>
+              <a:rPr lang="en-US" dirty="0"/>
+              <a:t> </a:t>
+            </a:r>
+            <a:r>
+              <a:rPr lang="en-US" dirty="0" err="1"/>
+              <a:t>isek</a:t>
+            </a:r>
+            <a:r>
+              <a:rPr lang="en-US" dirty="0"/>
+              <a:t> d: </a:t>
+            </a:r>
+            <a:r>
+              <a:rPr lang="tr-TR" dirty="0"/>
+              <a:t> i</a:t>
+            </a:r>
+            <a:r>
+              <a:rPr lang="en-US" dirty="0"/>
+              <a:t>le d </a:t>
+            </a:r>
+            <a:r>
+              <a:rPr lang="en-US" dirty="0" err="1"/>
+              <a:t>sürücüsü</a:t>
+            </a:r>
+            <a:r>
+              <a:rPr lang="en-US" dirty="0"/>
+              <a:t> </a:t>
+            </a:r>
+            <a:r>
+              <a:rPr lang="en-US" dirty="0" err="1"/>
+              <a:t>seçilir</a:t>
+            </a:r>
+            <a:r>
+              <a:rPr lang="en-US" dirty="0"/>
+              <a:t>)</a:t>
+            </a:r>
+          </a:p>
+          <a:p>
+            <a:pPr marL="0" indent="0">
+              <a:buNone/>
+            </a:pPr>
+            <a:r>
+              <a:rPr lang="tr-TR" dirty="0"/>
+              <a:t>	</a:t>
+            </a:r>
+            <a:r>
+              <a:rPr lang="tr-TR" dirty="0">
+                <a:solidFill>
+                  <a:srgbClr val="FF0000"/>
+                </a:solidFill>
+                <a:latin typeface="Consolas" panose="020B0609020204030204" pitchFamily="49" charset="0"/>
+              </a:rPr>
+              <a:t>&gt;</a:t>
+            </a:r>
+            <a:r>
+              <a:rPr lang="en-US" dirty="0">
+                <a:solidFill>
+                  <a:srgbClr val="FF0000"/>
+                </a:solidFill>
+                <a:latin typeface="Consolas" panose="020B0609020204030204" pitchFamily="49" charset="0"/>
+              </a:rPr>
+              <a:t>jupyter notebook</a:t>
+            </a:r>
+          </a:p>
+          <a:p>
+            <a:r>
+              <a:rPr lang="en-US" dirty="0"/>
+              <a:t>	</a:t>
+            </a:r>
+            <a:r>
+              <a:rPr lang="en-US" dirty="0" err="1"/>
+              <a:t>veya</a:t>
+            </a:r>
+            <a:endParaRPr lang="en-US" dirty="0"/>
+          </a:p>
+          <a:p>
+            <a:pPr marL="0" indent="0">
+              <a:buNone/>
+            </a:pPr>
+            <a:r>
+              <a:rPr lang="tr-TR" dirty="0"/>
+              <a:t>	</a:t>
+            </a:r>
+            <a:r>
+              <a:rPr lang="tr-TR" dirty="0">
+                <a:solidFill>
+                  <a:srgbClr val="FF0000"/>
+                </a:solidFill>
+                <a:latin typeface="Consolas" panose="020B0609020204030204" pitchFamily="49" charset="0"/>
+              </a:rPr>
+              <a:t>&gt;</a:t>
+            </a:r>
+            <a:r>
+              <a:rPr lang="en-US" dirty="0">
+                <a:solidFill>
+                  <a:srgbClr val="FF0000"/>
+                </a:solidFill>
+                <a:latin typeface="Consolas" panose="020B0609020204030204" pitchFamily="49" charset="0"/>
+              </a:rPr>
+              <a:t>python -m notebook</a:t>
+            </a:r>
+          </a:p>
+          <a:p>
+            <a:pPr marL="0" indent="0">
+              <a:buNone/>
+            </a:pPr>
+            <a:r>
+              <a:rPr lang="en-US" dirty="0" err="1"/>
+              <a:t>komutları</a:t>
+            </a:r>
+            <a:r>
+              <a:rPr lang="en-US" dirty="0"/>
+              <a:t> </a:t>
+            </a:r>
+            <a:r>
+              <a:rPr lang="en-US" dirty="0" err="1"/>
+              <a:t>ile</a:t>
+            </a:r>
+            <a:r>
+              <a:rPr lang="en-US" dirty="0"/>
+              <a:t> jupyter </a:t>
+            </a:r>
+            <a:r>
+              <a:rPr lang="en-US" dirty="0" err="1"/>
+              <a:t>çalıştırılır</a:t>
+            </a:r>
+            <a:r>
+              <a:rPr lang="en-US" dirty="0"/>
+              <a:t>.</a:t>
+            </a:r>
+          </a:p>
+        </p:txBody>
+      </p:sp>
+      <p:sp>
+        <p:nvSpPr>
+          <p:cNvPr id="4" name="Unvan 1">
+            <a:extLst>
+              <a:ext uri="{FF2B5EF4-FFF2-40B4-BE49-F238E27FC236}">
+                <a16:creationId xmlns:a16="http://schemas.microsoft.com/office/drawing/2014/main" id="{19A35561-AE1C-4134-A156-CF180727CFFB}"/>
+              </a:ext>
+            </a:extLst>
+          </p:cNvPr>
+          <p:cNvSpPr>
+            <a:spLocks noGrp="1"/>
+          </p:cNvSpPr>
+          <p:nvPr>
+            <p:ph type="title"/>
+          </p:nvPr>
+        </p:nvSpPr>
+        <p:spPr>
+          <a:xfrm>
+            <a:off x="757177" y="277793"/>
+            <a:ext cx="10515600" cy="592399"/>
+          </a:xfrm>
+        </p:spPr>
+        <p:txBody>
+          <a:bodyPr>
+            <a:normAutofit fontScale="90000"/>
+          </a:bodyPr>
+          <a:lstStyle/>
+          <a:p>
+            <a:pPr algn="ctr"/>
+            <a:r>
+              <a:rPr lang="tr-TR" sz="3800" b="1" dirty="0">
+                <a:solidFill>
+                  <a:srgbClr val="FF1F20"/>
+                </a:solidFill>
+                <a:latin typeface="Arial" panose="020B0604020202020204" pitchFamily="34" charset="0"/>
+                <a:ea typeface="Verdana" panose="020B0604030504040204" pitchFamily="34" charset="0"/>
+                <a:cs typeface="Arial" panose="020B0604020202020204" pitchFamily="34" charset="0"/>
+              </a:rPr>
+              <a:t>PAKETLERİ YÜKLENMESİ</a:t>
+            </a:r>
+            <a:endParaRPr lang="en-US" sz="3800" b="1" dirty="0">
+              <a:solidFill>
+                <a:srgbClr val="FF1F20"/>
+              </a:solidFill>
+              <a:latin typeface="Arial" panose="020B0604020202020204" pitchFamily="34" charset="0"/>
+              <a:ea typeface="Verdana" panose="020B0604030504040204" pitchFamily="34" charset="0"/>
+              <a:cs typeface="Arial" panose="020B0604020202020204" pitchFamily="34" charset="0"/>
+            </a:endParaRPr>
+          </a:p>
+        </p:txBody>
+      </p:sp>
+    </p:spTree>
+    <p:extLst>
+      <p:ext uri="{BB962C8B-B14F-4D97-AF65-F5344CB8AC3E}">
+        <p14:creationId xmlns:p14="http://schemas.microsoft.com/office/powerpoint/2010/main" val="1758723565"/>
+      </p:ext>
+    </p:extLst>
+  </p:cSld>
+  <p:clrMapOvr>
+    <a:masterClrMapping/>
+  </p:clrMapOvr>
+</p:sld>
+</file>
+
+<file path=ppt/slides/slide6.xml><?xml version="1.0" encoding="utf-8"?>
+<p:sld xmlns:a="http://schemas.openxmlformats.org/drawingml/2006/main" xmlns:r="http://schemas.openxmlformats.org/officeDocument/2006/relationships" xmlns:p="http://schemas.openxmlformats.org/presentationml/2006/main">
+  <p:cSld>
+    <p:spTree>
+      <p:nvGrpSpPr>
+        <p:cNvPr id="1" name=""/>
+        <p:cNvGrpSpPr/>
+        <p:nvPr/>
+      </p:nvGrpSpPr>
+      <p:grpSpPr>
+        <a:xfrm>
+          <a:off x="0" y="0"/>
+          <a:ext cx="0" cy="0"/>
+          <a:chOff x="0" y="0"/>
+          <a:chExt cx="0" cy="0"/>
+        </a:xfrm>
+      </p:grpSpPr>
+      <p:sp>
+        <p:nvSpPr>
+          <p:cNvPr id="2" name="Unvan 1">
+            <a:extLst>
+              <a:ext uri="{FF2B5EF4-FFF2-40B4-BE49-F238E27FC236}">
+                <a16:creationId xmlns:a16="http://schemas.microsoft.com/office/drawing/2014/main" id="{22244708-8A46-480B-8A6A-360BB392709C}"/>
+              </a:ext>
+            </a:extLst>
+          </p:cNvPr>
+          <p:cNvSpPr>
+            <a:spLocks noGrp="1"/>
+          </p:cNvSpPr>
+          <p:nvPr>
+            <p:ph type="title"/>
+          </p:nvPr>
+        </p:nvSpPr>
+        <p:spPr>
+          <a:xfrm>
+            <a:off x="838200" y="365125"/>
+            <a:ext cx="10515600" cy="722895"/>
+          </a:xfrm>
+        </p:spPr>
+        <p:txBody>
+          <a:bodyPr>
+            <a:normAutofit/>
+          </a:bodyPr>
+          <a:lstStyle/>
+          <a:p>
+            <a:pPr algn="ctr"/>
+            <a:r>
+              <a:rPr lang="en-US" sz="3800" b="1" dirty="0">
+                <a:solidFill>
+                  <a:srgbClr val="FF1F20"/>
+                </a:solidFill>
+                <a:latin typeface="Arial" panose="020B0604020202020204" pitchFamily="34" charset="0"/>
+                <a:ea typeface="Verdana" panose="020B0604030504040204" pitchFamily="34" charset="0"/>
+                <a:cs typeface="Arial" panose="020B0604020202020204" pitchFamily="34" charset="0"/>
+              </a:rPr>
+              <a:t>PYTHON </a:t>
+            </a:r>
+            <a:r>
+              <a:rPr lang="tr-TR" sz="3800" b="1" dirty="0">
+                <a:solidFill>
+                  <a:srgbClr val="FF1F20"/>
+                </a:solidFill>
+                <a:latin typeface="Arial" panose="020B0604020202020204" pitchFamily="34" charset="0"/>
+                <a:ea typeface="Verdana" panose="020B0604030504040204" pitchFamily="34" charset="0"/>
+                <a:cs typeface="Arial" panose="020B0604020202020204" pitchFamily="34" charset="0"/>
+              </a:rPr>
+              <a:t>VIRTUALENV</a:t>
+            </a:r>
+            <a:endParaRPr lang="en-US" sz="3800" b="1" dirty="0">
+              <a:solidFill>
+                <a:srgbClr val="FF1F20"/>
+              </a:solidFill>
+              <a:latin typeface="Arial" panose="020B0604020202020204" pitchFamily="34" charset="0"/>
+              <a:ea typeface="Verdana" panose="020B0604030504040204" pitchFamily="34" charset="0"/>
+              <a:cs typeface="Arial" panose="020B0604020202020204" pitchFamily="34" charset="0"/>
+            </a:endParaRPr>
+          </a:p>
+        </p:txBody>
+      </p:sp>
+      <p:sp>
+        <p:nvSpPr>
+          <p:cNvPr id="3" name="İçerik Yer Tutucusu 2">
+            <a:extLst>
+              <a:ext uri="{FF2B5EF4-FFF2-40B4-BE49-F238E27FC236}">
+                <a16:creationId xmlns:a16="http://schemas.microsoft.com/office/drawing/2014/main" id="{78143FBE-F5B7-47F5-9EED-32A2F1831001}"/>
+              </a:ext>
+            </a:extLst>
+          </p:cNvPr>
+          <p:cNvSpPr>
+            <a:spLocks noGrp="1"/>
+          </p:cNvSpPr>
+          <p:nvPr>
+            <p:ph idx="1"/>
+          </p:nvPr>
+        </p:nvSpPr>
+        <p:spPr>
+          <a:xfrm>
+            <a:off x="722453" y="1690687"/>
+            <a:ext cx="10515600" cy="4420745"/>
+          </a:xfrm>
+        </p:spPr>
+        <p:txBody>
+          <a:bodyPr/>
+          <a:lstStyle/>
+          <a:p>
+            <a:r>
+              <a:rPr lang="tr-TR" dirty="0"/>
+              <a:t>Her uygulamanın çalıştığı ortam farklı farklı olabilir.</a:t>
+            </a:r>
+          </a:p>
+          <a:p>
+            <a:r>
+              <a:rPr lang="tr-TR" dirty="0"/>
+              <a:t>Kimi Python 2.7 ile kimi Python 3.4 ile çalışır.</a:t>
+            </a:r>
+          </a:p>
+          <a:p>
+            <a:r>
+              <a:rPr lang="tr-TR" dirty="0"/>
+              <a:t>Bazı uygulamalar yazıldığında kullanılan paketler şimdi tedavülden kalkmış olabilir.</a:t>
+            </a:r>
+          </a:p>
+          <a:p>
+            <a:r>
+              <a:rPr lang="tr-TR" dirty="0" err="1"/>
+              <a:t>Tensorflow</a:t>
+            </a:r>
+            <a:r>
+              <a:rPr lang="tr-TR" dirty="0"/>
+              <a:t> 2.0 çıktı. Ama bugüne kadar yazılan kodların </a:t>
+            </a:r>
+            <a:r>
+              <a:rPr lang="tr-TR" dirty="0" err="1"/>
+              <a:t>hemem</a:t>
+            </a:r>
+            <a:r>
+              <a:rPr lang="tr-TR" dirty="0"/>
+              <a:t> hemen hepsi </a:t>
+            </a:r>
+            <a:r>
+              <a:rPr lang="tr-TR" dirty="0" err="1"/>
+              <a:t>Tensorflow</a:t>
+            </a:r>
+            <a:r>
+              <a:rPr lang="tr-TR" dirty="0"/>
+              <a:t> 1.X ile. Şimdi ne olacak?</a:t>
+            </a:r>
+          </a:p>
+          <a:p>
+            <a:r>
+              <a:rPr lang="tr-TR" dirty="0"/>
+              <a:t>Yukarıda belirtilen ve benzer sebeplerden dolayı amaca yönelik olarak sanal ortamlar yaratmak akıllıca olacaktır. Python </a:t>
+            </a:r>
+            <a:r>
+              <a:rPr lang="tr-TR" dirty="0" err="1"/>
+              <a:t>virtualenv</a:t>
+            </a:r>
+            <a:r>
+              <a:rPr lang="tr-TR" dirty="0"/>
+              <a:t> bunun için var.</a:t>
+            </a:r>
+          </a:p>
+          <a:p>
+            <a:pPr marL="0" indent="0">
+              <a:buNone/>
+            </a:pPr>
+            <a:endParaRPr lang="en-US" dirty="0"/>
+          </a:p>
+        </p:txBody>
+      </p:sp>
+    </p:spTree>
+    <p:extLst>
+      <p:ext uri="{BB962C8B-B14F-4D97-AF65-F5344CB8AC3E}">
+        <p14:creationId xmlns:p14="http://schemas.microsoft.com/office/powerpoint/2010/main" val="1673895305"/>
+      </p:ext>
+    </p:extLst>
+  </p:cSld>
+  <p:clrMapOvr>
+    <a:masterClrMapping/>
+  </p:clrMapOvr>
+</p:sld>
+</file>
+
+<file path=ppt/slides/slide7.xml><?xml version="1.0" encoding="utf-8"?>
+<p:sld xmlns:a="http://schemas.openxmlformats.org/drawingml/2006/main" xmlns:r="http://schemas.openxmlformats.org/officeDocument/2006/relationships" xmlns:p="http://schemas.openxmlformats.org/presentationml/2006/main">
+  <p:cSld>
+    <p:spTree>
+      <p:nvGrpSpPr>
+        <p:cNvPr id="1" name=""/>
+        <p:cNvGrpSpPr/>
+        <p:nvPr/>
+      </p:nvGrpSpPr>
+      <p:grpSpPr>
+        <a:xfrm>
+          <a:off x="0" y="0"/>
+          <a:ext cx="0" cy="0"/>
+          <a:chOff x="0" y="0"/>
+          <a:chExt cx="0" cy="0"/>
+        </a:xfrm>
+      </p:grpSpPr>
+      <p:sp>
+        <p:nvSpPr>
+          <p:cNvPr id="3" name="İçerik Yer Tutucusu 2">
+            <a:extLst>
+              <a:ext uri="{FF2B5EF4-FFF2-40B4-BE49-F238E27FC236}">
+                <a16:creationId xmlns:a16="http://schemas.microsoft.com/office/drawing/2014/main" id="{78143FBE-F5B7-47F5-9EED-32A2F1831001}"/>
+              </a:ext>
+            </a:extLst>
+          </p:cNvPr>
+          <p:cNvSpPr>
+            <a:spLocks noGrp="1"/>
+          </p:cNvSpPr>
+          <p:nvPr>
+            <p:ph idx="1"/>
+          </p:nvPr>
+        </p:nvSpPr>
+        <p:spPr>
+          <a:xfrm>
+            <a:off x="548833" y="1258466"/>
+            <a:ext cx="10423967" cy="4795094"/>
+          </a:xfrm>
+        </p:spPr>
+        <p:txBody>
+          <a:bodyPr>
+            <a:normAutofit/>
+          </a:bodyPr>
+          <a:lstStyle/>
+          <a:p>
+            <a:r>
+              <a:rPr lang="tr-TR" dirty="0" err="1"/>
+              <a:t>cmd</a:t>
+            </a:r>
+            <a:r>
+              <a:rPr lang="tr-TR" dirty="0"/>
+              <a:t> komut çalıştırınız.</a:t>
+            </a:r>
+            <a:r>
+              <a:rPr lang="tr-TR" dirty="0">
+                <a:latin typeface="Consolas" panose="020B0609020204030204" pitchFamily="49" charset="0"/>
+              </a:rPr>
+              <a:t>	</a:t>
+            </a:r>
+            <a:endParaRPr lang="en-US" dirty="0">
+              <a:latin typeface="Consolas" panose="020B0609020204030204" pitchFamily="49" charset="0"/>
+            </a:endParaRPr>
+          </a:p>
+          <a:p>
+            <a:r>
+              <a:rPr lang="tr-TR" dirty="0"/>
+              <a:t>Çalışma </a:t>
+            </a:r>
+            <a:r>
+              <a:rPr lang="tr-TR" dirty="0" err="1"/>
+              <a:t>dizni</a:t>
+            </a:r>
+            <a:r>
+              <a:rPr lang="tr-TR" dirty="0"/>
+              <a:t> oluşturma</a:t>
+            </a:r>
+          </a:p>
+          <a:p>
+            <a:pPr marL="0" indent="0">
+              <a:buNone/>
+            </a:pPr>
+            <a:r>
+              <a:rPr lang="tr-TR" dirty="0"/>
+              <a:t>	</a:t>
+            </a:r>
+            <a:r>
+              <a:rPr lang="tr-TR" dirty="0">
+                <a:solidFill>
+                  <a:srgbClr val="FF0000"/>
+                </a:solidFill>
+                <a:latin typeface="Consolas" panose="020B0609020204030204" pitchFamily="49" charset="0"/>
+              </a:rPr>
+              <a:t>&gt;</a:t>
+            </a:r>
+            <a:r>
+              <a:rPr lang="tr-TR" dirty="0" err="1">
+                <a:solidFill>
+                  <a:srgbClr val="FF0000"/>
+                </a:solidFill>
+                <a:latin typeface="Consolas" panose="020B0609020204030204" pitchFamily="49" charset="0"/>
+              </a:rPr>
+              <a:t>mkdir</a:t>
+            </a:r>
+            <a:r>
+              <a:rPr lang="tr-TR" dirty="0">
+                <a:solidFill>
+                  <a:srgbClr val="FF0000"/>
+                </a:solidFill>
+                <a:latin typeface="Consolas" panose="020B0609020204030204" pitchFamily="49" charset="0"/>
+              </a:rPr>
+              <a:t> </a:t>
+            </a:r>
+            <a:r>
+              <a:rPr lang="tr-TR" dirty="0" err="1">
+                <a:solidFill>
+                  <a:srgbClr val="FF0000"/>
+                </a:solidFill>
+                <a:latin typeface="Consolas" panose="020B0609020204030204" pitchFamily="49" charset="0"/>
+              </a:rPr>
+              <a:t>python_eğitim</a:t>
+            </a:r>
+            <a:endParaRPr lang="tr-TR" dirty="0">
+              <a:solidFill>
+                <a:srgbClr val="FF0000"/>
+              </a:solidFill>
+              <a:latin typeface="Consolas" panose="020B0609020204030204" pitchFamily="49" charset="0"/>
+            </a:endParaRPr>
+          </a:p>
+          <a:p>
+            <a:pPr marL="0" indent="0">
+              <a:buNone/>
+            </a:pPr>
+            <a:r>
+              <a:rPr lang="tr-TR" dirty="0">
+                <a:solidFill>
+                  <a:srgbClr val="FF0000"/>
+                </a:solidFill>
+                <a:latin typeface="Consolas" panose="020B0609020204030204" pitchFamily="49" charset="0"/>
+              </a:rPr>
+              <a:t>	&gt;cd </a:t>
+            </a:r>
+            <a:r>
+              <a:rPr lang="tr-TR" dirty="0" err="1">
+                <a:solidFill>
+                  <a:srgbClr val="FF0000"/>
+                </a:solidFill>
+                <a:latin typeface="Consolas" panose="020B0609020204030204" pitchFamily="49" charset="0"/>
+              </a:rPr>
+              <a:t>python_eğitim</a:t>
+            </a:r>
+            <a:endParaRPr lang="tr-TR" dirty="0">
+              <a:solidFill>
+                <a:srgbClr val="FF0000"/>
+              </a:solidFill>
+              <a:latin typeface="Consolas" panose="020B0609020204030204" pitchFamily="49" charset="0"/>
+            </a:endParaRPr>
+          </a:p>
+          <a:p>
+            <a:pPr marL="0" indent="0">
+              <a:buNone/>
+            </a:pPr>
+            <a:endParaRPr lang="tr-TR" dirty="0">
+              <a:solidFill>
+                <a:srgbClr val="FF0000"/>
+              </a:solidFill>
+              <a:latin typeface="Consolas" panose="020B0609020204030204" pitchFamily="49" charset="0"/>
+            </a:endParaRPr>
+          </a:p>
+          <a:p>
+            <a:pPr marL="0" indent="0">
+              <a:buNone/>
+            </a:pPr>
+            <a:endParaRPr lang="tr-TR" dirty="0">
+              <a:latin typeface="Consolas" panose="020B0609020204030204" pitchFamily="49" charset="0"/>
+            </a:endParaRPr>
+          </a:p>
+          <a:p>
+            <a:r>
+              <a:rPr lang="tr-TR" dirty="0"/>
+              <a:t>Ml adında bir sanal ortam oluşturma</a:t>
+            </a:r>
+          </a:p>
+          <a:p>
+            <a:pPr marL="0" indent="0">
+              <a:buNone/>
+            </a:pPr>
+            <a:r>
+              <a:rPr lang="tr-TR" dirty="0"/>
+              <a:t>	</a:t>
+            </a:r>
+            <a:r>
+              <a:rPr lang="tr-TR" dirty="0">
+                <a:solidFill>
+                  <a:srgbClr val="FF0000"/>
+                </a:solidFill>
+                <a:latin typeface="Consolas" panose="020B0609020204030204" pitchFamily="49" charset="0"/>
+              </a:rPr>
+              <a:t>&gt;</a:t>
+            </a:r>
+            <a:r>
+              <a:rPr lang="en-US" dirty="0">
+                <a:solidFill>
+                  <a:srgbClr val="FF0000"/>
+                </a:solidFill>
+                <a:latin typeface="Consolas" panose="020B0609020204030204" pitchFamily="49" charset="0"/>
+              </a:rPr>
+              <a:t>python -m </a:t>
+            </a:r>
+            <a:r>
+              <a:rPr lang="en-US" dirty="0" err="1">
+                <a:solidFill>
+                  <a:srgbClr val="FF0000"/>
+                </a:solidFill>
+                <a:latin typeface="Consolas" panose="020B0609020204030204" pitchFamily="49" charset="0"/>
+              </a:rPr>
+              <a:t>venv</a:t>
+            </a:r>
+            <a:r>
+              <a:rPr lang="en-US" dirty="0">
+                <a:solidFill>
+                  <a:srgbClr val="FF0000"/>
+                </a:solidFill>
+                <a:latin typeface="Consolas" panose="020B0609020204030204" pitchFamily="49" charset="0"/>
+              </a:rPr>
+              <a:t> </a:t>
+            </a:r>
+            <a:r>
+              <a:rPr lang="tr-TR" dirty="0">
+                <a:solidFill>
+                  <a:srgbClr val="FF0000"/>
+                </a:solidFill>
+                <a:latin typeface="Consolas" panose="020B0609020204030204" pitchFamily="49" charset="0"/>
+              </a:rPr>
+              <a:t>ml</a:t>
+            </a:r>
+            <a:endParaRPr lang="en-US" dirty="0">
+              <a:solidFill>
+                <a:srgbClr val="FF0000"/>
+              </a:solidFill>
+              <a:latin typeface="Consolas" panose="020B0609020204030204" pitchFamily="49" charset="0"/>
+            </a:endParaRPr>
+          </a:p>
+          <a:p>
+            <a:pPr marL="0" indent="0">
+              <a:buNone/>
+            </a:pPr>
+            <a:r>
+              <a:rPr lang="tr-TR" dirty="0"/>
+              <a:t>	biraz zaman alacaktır.</a:t>
+            </a:r>
+          </a:p>
+        </p:txBody>
+      </p:sp>
+      <p:sp>
+        <p:nvSpPr>
+          <p:cNvPr id="5" name="Unvan 1">
+            <a:extLst>
+              <a:ext uri="{FF2B5EF4-FFF2-40B4-BE49-F238E27FC236}">
+                <a16:creationId xmlns:a16="http://schemas.microsoft.com/office/drawing/2014/main" id="{65FBD687-77EB-446D-887B-C09F02F1EB8B}"/>
+              </a:ext>
+            </a:extLst>
+          </p:cNvPr>
+          <p:cNvSpPr>
+            <a:spLocks noGrp="1"/>
+          </p:cNvSpPr>
+          <p:nvPr>
+            <p:ph type="title"/>
+          </p:nvPr>
+        </p:nvSpPr>
+        <p:spPr>
+          <a:xfrm>
+            <a:off x="838200" y="272527"/>
+            <a:ext cx="10515600" cy="722895"/>
+          </a:xfrm>
+        </p:spPr>
+        <p:txBody>
+          <a:bodyPr>
+            <a:normAutofit/>
+          </a:bodyPr>
+          <a:lstStyle/>
+          <a:p>
+            <a:pPr algn="ctr"/>
+            <a:r>
+              <a:rPr lang="en-US" sz="3800" b="1" dirty="0">
+                <a:solidFill>
+                  <a:srgbClr val="FF1F20"/>
+                </a:solidFill>
+                <a:latin typeface="Arial" panose="020B0604020202020204" pitchFamily="34" charset="0"/>
+                <a:ea typeface="Verdana" panose="020B0604030504040204" pitchFamily="34" charset="0"/>
+                <a:cs typeface="Arial" panose="020B0604020202020204" pitchFamily="34" charset="0"/>
+              </a:rPr>
+              <a:t>PYTHON </a:t>
+            </a:r>
+            <a:r>
+              <a:rPr lang="tr-TR" sz="3800" b="1" dirty="0">
+                <a:solidFill>
+                  <a:srgbClr val="FF1F20"/>
+                </a:solidFill>
+                <a:latin typeface="Arial" panose="020B0604020202020204" pitchFamily="34" charset="0"/>
+                <a:ea typeface="Verdana" panose="020B0604030504040204" pitchFamily="34" charset="0"/>
+                <a:cs typeface="Arial" panose="020B0604020202020204" pitchFamily="34" charset="0"/>
+              </a:rPr>
+              <a:t>VIRTUALENV</a:t>
+            </a:r>
+            <a:endParaRPr lang="en-US" sz="3800" b="1" dirty="0">
+              <a:solidFill>
+                <a:srgbClr val="FF1F20"/>
+              </a:solidFill>
+              <a:latin typeface="Arial" panose="020B0604020202020204" pitchFamily="34" charset="0"/>
+              <a:ea typeface="Verdana" panose="020B0604030504040204" pitchFamily="34" charset="0"/>
+              <a:cs typeface="Arial" panose="020B0604020202020204" pitchFamily="34" charset="0"/>
+            </a:endParaRPr>
+          </a:p>
+        </p:txBody>
+      </p:sp>
+    </p:spTree>
+    <p:extLst>
+      <p:ext uri="{BB962C8B-B14F-4D97-AF65-F5344CB8AC3E}">
+        <p14:creationId xmlns:p14="http://schemas.microsoft.com/office/powerpoint/2010/main" val="1132326023"/>
+      </p:ext>
+    </p:extLst>
+  </p:cSld>
+  <p:clrMapOvr>
+    <a:masterClrMapping/>
+  </p:clrMapOvr>
+</p:sld>
+</file>
+
+<file path=ppt/slides/slide8.xml><?xml version="1.0" encoding="utf-8"?>
+<p:sld xmlns:a="http://schemas.openxmlformats.org/drawingml/2006/main" xmlns:r="http://schemas.openxmlformats.org/officeDocument/2006/relationships" xmlns:p="http://schemas.openxmlformats.org/presentationml/2006/main">
+  <p:cSld>
+    <p:spTree>
+      <p:nvGrpSpPr>
+        <p:cNvPr id="1" name=""/>
+        <p:cNvGrpSpPr/>
+        <p:nvPr/>
+      </p:nvGrpSpPr>
+      <p:grpSpPr>
+        <a:xfrm>
+          <a:off x="0" y="0"/>
+          <a:ext cx="0" cy="0"/>
+          <a:chOff x="0" y="0"/>
+          <a:chExt cx="0" cy="0"/>
+        </a:xfrm>
+      </p:grpSpPr>
+      <p:sp>
+        <p:nvSpPr>
+          <p:cNvPr id="4" name="İçerik Yer Tutucusu 2">
+            <a:extLst>
+              <a:ext uri="{FF2B5EF4-FFF2-40B4-BE49-F238E27FC236}">
+                <a16:creationId xmlns:a16="http://schemas.microsoft.com/office/drawing/2014/main" id="{3FAE0397-3F4E-41EC-AD8C-D61E7C8BD088}"/>
+              </a:ext>
+            </a:extLst>
+          </p:cNvPr>
+          <p:cNvSpPr txBox="1">
+            <a:spLocks/>
+          </p:cNvSpPr>
+          <p:nvPr/>
+        </p:nvSpPr>
+        <p:spPr>
+          <a:xfrm>
+            <a:off x="586933" y="1181924"/>
+            <a:ext cx="11018134" cy="5230451"/>
+          </a:xfrm>
+          <a:prstGeom prst="rect">
+            <a:avLst/>
+          </a:prstGeom>
+        </p:spPr>
+        <p:txBody>
+          <a:bodyPr vert="horz" lIns="91440" tIns="45720" rIns="91440" bIns="45720" rtlCol="0">
+            <a:normAutofit lnSpcReduction="10000"/>
+          </a:bodyPr>
+          <a:lstStyle>
+            <a:lvl1pPr marL="228600" indent="-228600" algn="l" defTabSz="914400" rtl="0" eaLnBrk="1" latinLnBrk="0" hangingPunct="1">
+              <a:lnSpc>
+                <a:spcPct val="90000"/>
+              </a:lnSpc>
+              <a:spcBef>
+                <a:spcPts val="1000"/>
+              </a:spcBef>
+              <a:buFont typeface="Arial" panose="020B0604020202020204" pitchFamily="34" charset="0"/>
+              <a:buChar char="•"/>
+              <a:defRPr sz="2800" kern="1200">
+                <a:solidFill>
+                  <a:schemeClr val="tx1"/>
+                </a:solidFill>
+                <a:latin typeface="+mn-lt"/>
+                <a:ea typeface="+mn-ea"/>
+                <a:cs typeface="+mn-cs"/>
+              </a:defRPr>
+            </a:lvl1pPr>
+            <a:lvl2pPr marL="685800" indent="-228600" algn="l" defTabSz="914400" rtl="0" eaLnBrk="1" latinLnBrk="0" hangingPunct="1">
+              <a:lnSpc>
+                <a:spcPct val="90000"/>
+              </a:lnSpc>
+              <a:spcBef>
+                <a:spcPts val="500"/>
+              </a:spcBef>
+              <a:buFont typeface="Arial" panose="020B0604020202020204" pitchFamily="34" charset="0"/>
+              <a:buChar char="•"/>
+              <a:defRPr sz="2400" kern="1200">
+                <a:solidFill>
+                  <a:schemeClr val="tx1"/>
+                </a:solidFill>
+                <a:latin typeface="+mn-lt"/>
+                <a:ea typeface="+mn-ea"/>
+                <a:cs typeface="+mn-cs"/>
+              </a:defRPr>
+            </a:lvl2pPr>
+            <a:lvl3pPr marL="1143000" indent="-228600" algn="l" defTabSz="914400" rtl="0" eaLnBrk="1" latinLnBrk="0" hangingPunct="1">
+              <a:lnSpc>
+                <a:spcPct val="90000"/>
+              </a:lnSpc>
+              <a:spcBef>
+                <a:spcPts val="500"/>
+              </a:spcBef>
+              <a:buFont typeface="Arial" panose="020B0604020202020204" pitchFamily="34" charset="0"/>
+              <a:buChar char="•"/>
+              <a:defRPr sz="2000" kern="1200">
+                <a:solidFill>
+                  <a:schemeClr val="tx1"/>
+                </a:solidFill>
+                <a:latin typeface="+mn-lt"/>
+                <a:ea typeface="+mn-ea"/>
+                <a:cs typeface="+mn-cs"/>
+              </a:defRPr>
+            </a:lvl3pPr>
+            <a:lvl4pPr marL="1600200" indent="-228600" algn="l" defTabSz="914400" rtl="0" eaLnBrk="1" latinLnBrk="0" hangingPunct="1">
+              <a:lnSpc>
+                <a:spcPct val="90000"/>
+              </a:lnSpc>
+              <a:spcBef>
+                <a:spcPts val="500"/>
+              </a:spcBef>
+              <a:buFont typeface="Arial" panose="020B0604020202020204" pitchFamily="34" charset="0"/>
+              <a:buChar char="•"/>
+              <a:defRPr sz="1800" kern="1200">
+                <a:solidFill>
+                  <a:schemeClr val="tx1"/>
+                </a:solidFill>
+                <a:latin typeface="+mn-lt"/>
+                <a:ea typeface="+mn-ea"/>
+                <a:cs typeface="+mn-cs"/>
+              </a:defRPr>
+            </a:lvl4pPr>
+            <a:lvl5pPr marL="2057400" indent="-228600" algn="l" defTabSz="914400" rtl="0" eaLnBrk="1" latinLnBrk="0" hangingPunct="1">
+              <a:lnSpc>
+                <a:spcPct val="90000"/>
+              </a:lnSpc>
+              <a:spcBef>
+                <a:spcPts val="500"/>
+              </a:spcBef>
+              <a:buFont typeface="Arial" panose="020B0604020202020204" pitchFamily="34" charset="0"/>
+              <a:buChar char="•"/>
+              <a:defRPr sz="1800" kern="1200">
+                <a:solidFill>
+                  <a:schemeClr val="tx1"/>
+                </a:solidFill>
+                <a:latin typeface="+mn-lt"/>
+                <a:ea typeface="+mn-ea"/>
+                <a:cs typeface="+mn-cs"/>
+              </a:defRPr>
+            </a:lvl5pPr>
+            <a:lvl6pPr marL="2514600" indent="-228600" algn="l" defTabSz="914400" rtl="0" eaLnBrk="1" latinLnBrk="0" hangingPunct="1">
+              <a:lnSpc>
+                <a:spcPct val="90000"/>
+              </a:lnSpc>
+              <a:spcBef>
+                <a:spcPts val="500"/>
+              </a:spcBef>
+              <a:buFont typeface="Arial" panose="020B0604020202020204" pitchFamily="34" charset="0"/>
+              <a:buChar char="•"/>
+              <a:defRPr sz="1800" kern="1200">
+                <a:solidFill>
+                  <a:schemeClr val="tx1"/>
+                </a:solidFill>
+                <a:latin typeface="+mn-lt"/>
+                <a:ea typeface="+mn-ea"/>
+                <a:cs typeface="+mn-cs"/>
+              </a:defRPr>
+            </a:lvl6pPr>
+            <a:lvl7pPr marL="2971800" indent="-228600" algn="l" defTabSz="914400" rtl="0" eaLnBrk="1" latinLnBrk="0" hangingPunct="1">
+              <a:lnSpc>
+                <a:spcPct val="90000"/>
+              </a:lnSpc>
+              <a:spcBef>
+                <a:spcPts val="500"/>
+              </a:spcBef>
+              <a:buFont typeface="Arial" panose="020B0604020202020204" pitchFamily="34" charset="0"/>
+              <a:buChar char="•"/>
+              <a:defRPr sz="1800" kern="1200">
+                <a:solidFill>
+                  <a:schemeClr val="tx1"/>
+                </a:solidFill>
+                <a:latin typeface="+mn-lt"/>
+                <a:ea typeface="+mn-ea"/>
+                <a:cs typeface="+mn-cs"/>
+              </a:defRPr>
+            </a:lvl7pPr>
+            <a:lvl8pPr marL="3429000" indent="-228600" algn="l" defTabSz="914400" rtl="0" eaLnBrk="1" latinLnBrk="0" hangingPunct="1">
+              <a:lnSpc>
+                <a:spcPct val="90000"/>
+              </a:lnSpc>
+              <a:spcBef>
+                <a:spcPts val="500"/>
+              </a:spcBef>
+              <a:buFont typeface="Arial" panose="020B0604020202020204" pitchFamily="34" charset="0"/>
+              <a:buChar char="•"/>
+              <a:defRPr sz="1800" kern="1200">
+                <a:solidFill>
+                  <a:schemeClr val="tx1"/>
+                </a:solidFill>
+                <a:latin typeface="+mn-lt"/>
+                <a:ea typeface="+mn-ea"/>
+                <a:cs typeface="+mn-cs"/>
+              </a:defRPr>
+            </a:lvl8pPr>
+            <a:lvl9pPr marL="3886200" indent="-228600" algn="l" defTabSz="914400" rtl="0" eaLnBrk="1" latinLnBrk="0" hangingPunct="1">
+              <a:lnSpc>
+                <a:spcPct val="90000"/>
+              </a:lnSpc>
+              <a:spcBef>
+                <a:spcPts val="500"/>
+              </a:spcBef>
+              <a:buFont typeface="Arial" panose="020B0604020202020204" pitchFamily="34" charset="0"/>
+              <a:buChar char="•"/>
+              <a:defRPr sz="1800" kern="1200">
+                <a:solidFill>
+                  <a:schemeClr val="tx1"/>
+                </a:solidFill>
+                <a:latin typeface="+mn-lt"/>
+                <a:ea typeface="+mn-ea"/>
+                <a:cs typeface="+mn-cs"/>
+              </a:defRPr>
+            </a:lvl9pPr>
+          </a:lstStyle>
+          <a:p>
+            <a:r>
+              <a:rPr lang="tr-TR" dirty="0" err="1"/>
+              <a:t>Konrol</a:t>
+            </a:r>
+            <a:r>
+              <a:rPr lang="tr-TR" dirty="0"/>
+              <a:t> edelim</a:t>
+            </a:r>
+          </a:p>
+          <a:p>
+            <a:pPr marL="0" indent="0">
+              <a:buFont typeface="Arial" panose="020B0604020202020204" pitchFamily="34" charset="0"/>
+              <a:buNone/>
+            </a:pPr>
+            <a:r>
+              <a:rPr lang="tr-TR" dirty="0">
+                <a:latin typeface="Consolas" panose="020B0609020204030204" pitchFamily="49" charset="0"/>
+              </a:rPr>
+              <a:t>	</a:t>
+            </a:r>
+            <a:r>
+              <a:rPr lang="tr-TR" dirty="0">
+                <a:solidFill>
+                  <a:srgbClr val="FF0000"/>
+                </a:solidFill>
+                <a:latin typeface="Consolas" panose="020B0609020204030204" pitchFamily="49" charset="0"/>
+              </a:rPr>
+              <a:t>&gt;</a:t>
+            </a:r>
+            <a:r>
+              <a:rPr lang="tr-TR" dirty="0" err="1">
+                <a:solidFill>
+                  <a:srgbClr val="FF0000"/>
+                </a:solidFill>
+                <a:latin typeface="Consolas" panose="020B0609020204030204" pitchFamily="49" charset="0"/>
+              </a:rPr>
+              <a:t>dir</a:t>
+            </a:r>
+            <a:endParaRPr lang="tr-TR" dirty="0">
+              <a:solidFill>
+                <a:srgbClr val="FF0000"/>
+              </a:solidFill>
+              <a:latin typeface="Consolas" panose="020B0609020204030204" pitchFamily="49" charset="0"/>
+            </a:endParaRPr>
+          </a:p>
+          <a:p>
+            <a:pPr marL="914400" lvl="2" indent="0">
+              <a:buNone/>
+            </a:pPr>
+            <a:r>
+              <a:rPr lang="tr-TR" dirty="0">
+                <a:latin typeface="Consolas" panose="020B0609020204030204" pitchFamily="49" charset="0"/>
+              </a:rPr>
+              <a:t>C:\Users\user\python_egitim&gt;dir</a:t>
+            </a:r>
+          </a:p>
+          <a:p>
+            <a:pPr marL="914400" lvl="2" indent="0">
+              <a:buNone/>
+            </a:pPr>
+            <a:r>
+              <a:rPr lang="tr-TR" dirty="0">
+                <a:latin typeface="Consolas" panose="020B0609020204030204" pitchFamily="49" charset="0"/>
+              </a:rPr>
+              <a:t> Volume in </a:t>
+            </a:r>
+            <a:r>
+              <a:rPr lang="tr-TR" dirty="0" err="1">
+                <a:latin typeface="Consolas" panose="020B0609020204030204" pitchFamily="49" charset="0"/>
+              </a:rPr>
+              <a:t>drive</a:t>
+            </a:r>
+            <a:r>
+              <a:rPr lang="tr-TR" dirty="0">
+                <a:latin typeface="Consolas" panose="020B0609020204030204" pitchFamily="49" charset="0"/>
+              </a:rPr>
+              <a:t> C has </a:t>
+            </a:r>
+            <a:r>
+              <a:rPr lang="tr-TR" dirty="0" err="1">
+                <a:latin typeface="Consolas" panose="020B0609020204030204" pitchFamily="49" charset="0"/>
+              </a:rPr>
+              <a:t>no</a:t>
+            </a:r>
+            <a:r>
+              <a:rPr lang="tr-TR" dirty="0">
+                <a:latin typeface="Consolas" panose="020B0609020204030204" pitchFamily="49" charset="0"/>
+              </a:rPr>
+              <a:t> </a:t>
+            </a:r>
+            <a:r>
+              <a:rPr lang="tr-TR" dirty="0" err="1">
+                <a:latin typeface="Consolas" panose="020B0609020204030204" pitchFamily="49" charset="0"/>
+              </a:rPr>
+              <a:t>label</a:t>
+            </a:r>
+            <a:r>
+              <a:rPr lang="tr-TR" dirty="0">
+                <a:latin typeface="Consolas" panose="020B0609020204030204" pitchFamily="49" charset="0"/>
+              </a:rPr>
+              <a:t>.</a:t>
+            </a:r>
+          </a:p>
+          <a:p>
+            <a:pPr marL="914400" lvl="2" indent="0">
+              <a:buNone/>
+            </a:pPr>
+            <a:r>
+              <a:rPr lang="tr-TR" dirty="0">
+                <a:latin typeface="Consolas" panose="020B0609020204030204" pitchFamily="49" charset="0"/>
+              </a:rPr>
+              <a:t> Volume </a:t>
+            </a:r>
+            <a:r>
+              <a:rPr lang="tr-TR" dirty="0" err="1">
+                <a:latin typeface="Consolas" panose="020B0609020204030204" pitchFamily="49" charset="0"/>
+              </a:rPr>
+              <a:t>Serial</a:t>
+            </a:r>
+            <a:r>
+              <a:rPr lang="tr-TR" dirty="0">
+                <a:latin typeface="Consolas" panose="020B0609020204030204" pitchFamily="49" charset="0"/>
+              </a:rPr>
+              <a:t> </a:t>
+            </a:r>
+            <a:r>
+              <a:rPr lang="tr-TR" dirty="0" err="1">
+                <a:latin typeface="Consolas" panose="020B0609020204030204" pitchFamily="49" charset="0"/>
+              </a:rPr>
+              <a:t>Number</a:t>
+            </a:r>
+            <a:r>
+              <a:rPr lang="tr-TR" dirty="0">
+                <a:latin typeface="Consolas" panose="020B0609020204030204" pitchFamily="49" charset="0"/>
+              </a:rPr>
+              <a:t> is 55F6-35C4</a:t>
+            </a:r>
+          </a:p>
+          <a:p>
+            <a:pPr marL="914400" lvl="2" indent="0">
+              <a:buNone/>
+            </a:pPr>
+            <a:endParaRPr lang="tr-TR" dirty="0">
+              <a:latin typeface="Consolas" panose="020B0609020204030204" pitchFamily="49" charset="0"/>
+            </a:endParaRPr>
+          </a:p>
+          <a:p>
+            <a:pPr marL="914400" lvl="2" indent="0">
+              <a:buNone/>
+            </a:pPr>
+            <a:r>
+              <a:rPr lang="tr-TR" dirty="0">
+                <a:latin typeface="Consolas" panose="020B0609020204030204" pitchFamily="49" charset="0"/>
+              </a:rPr>
+              <a:t> Directory of C:\Users\user\python_egitim</a:t>
+            </a:r>
+          </a:p>
+          <a:p>
+            <a:pPr marL="914400" lvl="2" indent="0">
+              <a:buNone/>
+            </a:pPr>
+            <a:endParaRPr lang="tr-TR" dirty="0">
+              <a:latin typeface="Consolas" panose="020B0609020204030204" pitchFamily="49" charset="0"/>
+            </a:endParaRPr>
+          </a:p>
+          <a:p>
+            <a:pPr marL="914400" lvl="2" indent="0">
+              <a:buNone/>
+            </a:pPr>
+            <a:r>
+              <a:rPr lang="tr-TR" dirty="0">
+                <a:latin typeface="Consolas" panose="020B0609020204030204" pitchFamily="49" charset="0"/>
+              </a:rPr>
+              <a:t>01.10.2019  17:30    &lt;DIR&gt;          .</a:t>
+            </a:r>
+          </a:p>
+          <a:p>
+            <a:pPr marL="914400" lvl="2" indent="0">
+              <a:buNone/>
+            </a:pPr>
+            <a:r>
+              <a:rPr lang="tr-TR" dirty="0">
+                <a:latin typeface="Consolas" panose="020B0609020204030204" pitchFamily="49" charset="0"/>
+              </a:rPr>
+              <a:t>01.10.2019  17:30    &lt;DIR&gt;          ..</a:t>
+            </a:r>
+          </a:p>
+          <a:p>
+            <a:pPr marL="914400" lvl="2" indent="0">
+              <a:buNone/>
+            </a:pPr>
+            <a:r>
+              <a:rPr lang="tr-TR" dirty="0">
+                <a:latin typeface="Consolas" panose="020B0609020204030204" pitchFamily="49" charset="0"/>
+              </a:rPr>
+              <a:t>01.10.2019  17:30    &lt;DIR&gt;          ml</a:t>
+            </a:r>
+          </a:p>
+          <a:p>
+            <a:pPr marL="914400" lvl="2" indent="0">
+              <a:buNone/>
+            </a:pPr>
+            <a:r>
+              <a:rPr lang="tr-TR" dirty="0">
+                <a:latin typeface="Consolas" panose="020B0609020204030204" pitchFamily="49" charset="0"/>
+              </a:rPr>
+              <a:t>19.08.2019  10:22    &lt;DIR&gt;          </a:t>
+            </a:r>
+            <a:r>
+              <a:rPr lang="tr-TR" dirty="0" err="1">
+                <a:latin typeface="Consolas" panose="020B0609020204030204" pitchFamily="49" charset="0"/>
+              </a:rPr>
+              <a:t>mongodb</a:t>
+            </a:r>
+            <a:endParaRPr lang="tr-TR" dirty="0">
+              <a:latin typeface="Consolas" panose="020B0609020204030204" pitchFamily="49" charset="0"/>
+            </a:endParaRPr>
+          </a:p>
+          <a:p>
+            <a:pPr marL="914400" lvl="2" indent="0">
+              <a:buNone/>
+            </a:pPr>
+            <a:r>
+              <a:rPr lang="tr-TR" dirty="0">
+                <a:latin typeface="Consolas" panose="020B0609020204030204" pitchFamily="49" charset="0"/>
+              </a:rPr>
+              <a:t>28.07.2019  14:58    &lt;DIR&gt;          tensorflow-1</a:t>
+            </a:r>
+          </a:p>
+          <a:p>
+            <a:pPr marL="914400" lvl="2" indent="0">
+              <a:buNone/>
+            </a:pPr>
+            <a:r>
+              <a:rPr lang="tr-TR" dirty="0">
+                <a:latin typeface="Consolas" panose="020B0609020204030204" pitchFamily="49" charset="0"/>
+              </a:rPr>
+              <a:t>28.07.2019  15:19    &lt;DIR&gt;          tensorflow-2</a:t>
+            </a:r>
+          </a:p>
+          <a:p>
+            <a:pPr marL="914400" lvl="2" indent="0">
+              <a:buNone/>
+            </a:pPr>
+            <a:r>
+              <a:rPr lang="tr-TR" dirty="0">
+                <a:latin typeface="Consolas" panose="020B0609020204030204" pitchFamily="49" charset="0"/>
+              </a:rPr>
+              <a:t>               0 File(s)              0 </a:t>
+            </a:r>
+            <a:r>
+              <a:rPr lang="tr-TR" dirty="0" err="1">
+                <a:latin typeface="Consolas" panose="020B0609020204030204" pitchFamily="49" charset="0"/>
+              </a:rPr>
+              <a:t>bytes</a:t>
+            </a:r>
+            <a:endParaRPr lang="tr-TR" dirty="0">
+              <a:latin typeface="Consolas" panose="020B0609020204030204" pitchFamily="49" charset="0"/>
+            </a:endParaRPr>
+          </a:p>
+          <a:p>
+            <a:pPr marL="914400" lvl="2" indent="0">
+              <a:buNone/>
+            </a:pPr>
+            <a:r>
+              <a:rPr lang="tr-TR" dirty="0">
+                <a:latin typeface="Consolas" panose="020B0609020204030204" pitchFamily="49" charset="0"/>
+              </a:rPr>
+              <a:t>               6 </a:t>
+            </a:r>
+            <a:r>
+              <a:rPr lang="tr-TR" dirty="0" err="1">
+                <a:latin typeface="Consolas" panose="020B0609020204030204" pitchFamily="49" charset="0"/>
+              </a:rPr>
+              <a:t>Dir</a:t>
+            </a:r>
+            <a:r>
+              <a:rPr lang="tr-TR" dirty="0">
+                <a:latin typeface="Consolas" panose="020B0609020204030204" pitchFamily="49" charset="0"/>
+              </a:rPr>
+              <a:t>(s)  694.778.335.232 </a:t>
+            </a:r>
+            <a:r>
+              <a:rPr lang="tr-TR" dirty="0" err="1">
+                <a:latin typeface="Consolas" panose="020B0609020204030204" pitchFamily="49" charset="0"/>
+              </a:rPr>
+              <a:t>bytes</a:t>
+            </a:r>
+            <a:r>
+              <a:rPr lang="tr-TR" dirty="0">
+                <a:latin typeface="Consolas" panose="020B0609020204030204" pitchFamily="49" charset="0"/>
+              </a:rPr>
+              <a:t> </a:t>
+            </a:r>
+            <a:r>
+              <a:rPr lang="tr-TR" dirty="0" err="1">
+                <a:latin typeface="Consolas" panose="020B0609020204030204" pitchFamily="49" charset="0"/>
+              </a:rPr>
+              <a:t>free</a:t>
+            </a:r>
+            <a:endParaRPr lang="tr-TR" dirty="0">
+              <a:latin typeface="Consolas" panose="020B0609020204030204" pitchFamily="49" charset="0"/>
+            </a:endParaRPr>
+          </a:p>
+        </p:txBody>
+      </p:sp>
+      <p:sp>
+        <p:nvSpPr>
+          <p:cNvPr id="6" name="Dikdörtgen 5">
+            <a:extLst>
+              <a:ext uri="{FF2B5EF4-FFF2-40B4-BE49-F238E27FC236}">
+                <a16:creationId xmlns:a16="http://schemas.microsoft.com/office/drawing/2014/main" id="{2A22277E-125D-4746-93A4-4DE110CCF8DB}"/>
+              </a:ext>
+            </a:extLst>
+          </p:cNvPr>
+          <p:cNvSpPr/>
+          <p:nvPr/>
+        </p:nvSpPr>
+        <p:spPr>
+          <a:xfrm>
+            <a:off x="1377387" y="3958542"/>
+            <a:ext cx="5845216" cy="451412"/>
+          </a:xfrm>
+          <a:prstGeom prst="rect">
+            <a:avLst/>
+          </a:prstGeom>
+          <a:noFill/>
+          <a:ln w="57150">
+            <a:solidFill>
+              <a:srgbClr val="FF0000"/>
+            </a:solidFill>
+          </a:ln>
+        </p:spPr>
+        <p:style>
+          <a:lnRef idx="2">
+            <a:schemeClr val="accent1">
+              <a:shade val="50000"/>
+            </a:schemeClr>
+          </a:lnRef>
+          <a:fillRef idx="1">
+            <a:schemeClr val="accent1"/>
+          </a:fillRef>
+          <a:effectRef idx="0">
+            <a:schemeClr val="accent1"/>
+          </a:effectRef>
+          <a:fontRef idx="minor">
+            <a:schemeClr val="lt1"/>
+          </a:fontRef>
+        </p:style>
+        <p:txBody>
+          <a:bodyPr rtlCol="0" anchor="ctr"/>
+          <a:lstStyle/>
+          <a:p>
+            <a:pPr algn="ctr"/>
+            <a:endParaRPr lang="tr-TR"/>
+          </a:p>
+        </p:txBody>
+      </p:sp>
+      <p:sp>
+        <p:nvSpPr>
+          <p:cNvPr id="7" name="Unvan 1">
+            <a:extLst>
+              <a:ext uri="{FF2B5EF4-FFF2-40B4-BE49-F238E27FC236}">
+                <a16:creationId xmlns:a16="http://schemas.microsoft.com/office/drawing/2014/main" id="{874704D3-D16C-4D8E-8384-BE18FA6F9380}"/>
+              </a:ext>
+            </a:extLst>
+          </p:cNvPr>
+          <p:cNvSpPr>
+            <a:spLocks noGrp="1"/>
+          </p:cNvSpPr>
+          <p:nvPr>
+            <p:ph type="title"/>
+          </p:nvPr>
+        </p:nvSpPr>
+        <p:spPr>
+          <a:xfrm>
+            <a:off x="838200" y="325398"/>
+            <a:ext cx="10515600" cy="722895"/>
+          </a:xfrm>
+        </p:spPr>
+        <p:txBody>
+          <a:bodyPr>
+            <a:normAutofit/>
+          </a:bodyPr>
+          <a:lstStyle/>
+          <a:p>
+            <a:pPr algn="ctr"/>
+            <a:r>
+              <a:rPr lang="en-US" sz="3800" b="1" dirty="0">
+                <a:solidFill>
+                  <a:srgbClr val="FF1F20"/>
+                </a:solidFill>
+                <a:latin typeface="Arial" panose="020B0604020202020204" pitchFamily="34" charset="0"/>
+                <a:ea typeface="Verdana" panose="020B0604030504040204" pitchFamily="34" charset="0"/>
+                <a:cs typeface="Arial" panose="020B0604020202020204" pitchFamily="34" charset="0"/>
+              </a:rPr>
+              <a:t>PYTHON </a:t>
+            </a:r>
+            <a:r>
+              <a:rPr lang="tr-TR" sz="3800" b="1" dirty="0">
+                <a:solidFill>
+                  <a:srgbClr val="FF1F20"/>
+                </a:solidFill>
+                <a:latin typeface="Arial" panose="020B0604020202020204" pitchFamily="34" charset="0"/>
+                <a:ea typeface="Verdana" panose="020B0604030504040204" pitchFamily="34" charset="0"/>
+                <a:cs typeface="Arial" panose="020B0604020202020204" pitchFamily="34" charset="0"/>
+              </a:rPr>
+              <a:t>VIRTUALENV</a:t>
+            </a:r>
+            <a:endParaRPr lang="en-US" sz="3800" b="1" dirty="0">
+              <a:solidFill>
+                <a:srgbClr val="FF1F20"/>
+              </a:solidFill>
+              <a:latin typeface="Arial" panose="020B0604020202020204" pitchFamily="34" charset="0"/>
+              <a:ea typeface="Verdana" panose="020B0604030504040204" pitchFamily="34" charset="0"/>
+              <a:cs typeface="Arial" panose="020B0604020202020204" pitchFamily="34" charset="0"/>
+            </a:endParaRPr>
+          </a:p>
+        </p:txBody>
+      </p:sp>
+    </p:spTree>
+    <p:extLst>
+      <p:ext uri="{BB962C8B-B14F-4D97-AF65-F5344CB8AC3E}">
+        <p14:creationId xmlns:p14="http://schemas.microsoft.com/office/powerpoint/2010/main" val="3447595021"/>
+      </p:ext>
+    </p:extLst>
+  </p:cSld>
+  <p:clrMapOvr>
+    <a:masterClrMapping/>
+  </p:clrMapOvr>
+</p:sld>
+</file>
+
+<file path=ppt/slides/slide9.xml><?xml version="1.0" encoding="utf-8"?>
+<p:sld xmlns:a="http://schemas.openxmlformats.org/drawingml/2006/main" xmlns:r="http://schemas.openxmlformats.org/officeDocument/2006/relationships" xmlns:p="http://schemas.openxmlformats.org/presentationml/2006/main">
+  <p:cSld>
+    <p:spTree>
+      <p:nvGrpSpPr>
+        <p:cNvPr id="1" name=""/>
+        <p:cNvGrpSpPr/>
+        <p:nvPr/>
+      </p:nvGrpSpPr>
+      <p:grpSpPr>
+        <a:xfrm>
+          <a:off x="0" y="0"/>
+          <a:ext cx="0" cy="0"/>
+          <a:chOff x="0" y="0"/>
+          <a:chExt cx="0" cy="0"/>
+        </a:xfrm>
+      </p:grpSpPr>
+      <p:sp>
+        <p:nvSpPr>
+          <p:cNvPr id="4" name="İçerik Yer Tutucusu 2">
+            <a:extLst>
+              <a:ext uri="{FF2B5EF4-FFF2-40B4-BE49-F238E27FC236}">
+                <a16:creationId xmlns:a16="http://schemas.microsoft.com/office/drawing/2014/main" id="{3FAE0397-3F4E-41EC-AD8C-D61E7C8BD088}"/>
+              </a:ext>
+            </a:extLst>
+          </p:cNvPr>
+          <p:cNvSpPr txBox="1">
+            <a:spLocks/>
+          </p:cNvSpPr>
+          <p:nvPr/>
+        </p:nvSpPr>
+        <p:spPr>
+          <a:xfrm>
+            <a:off x="586933" y="1181924"/>
+            <a:ext cx="11018134" cy="5230451"/>
+          </a:xfrm>
+          <a:prstGeom prst="rect">
+            <a:avLst/>
+          </a:prstGeom>
+        </p:spPr>
+        <p:txBody>
+          <a:bodyPr vert="horz" lIns="91440" tIns="45720" rIns="91440" bIns="45720" rtlCol="0">
+            <a:normAutofit fontScale="70000" lnSpcReduction="20000"/>
+          </a:bodyPr>
+          <a:lstStyle>
+            <a:lvl1pPr marL="228600" indent="-228600" algn="l" defTabSz="914400" rtl="0" eaLnBrk="1" latinLnBrk="0" hangingPunct="1">
+              <a:lnSpc>
+                <a:spcPct val="90000"/>
+              </a:lnSpc>
+              <a:spcBef>
+                <a:spcPts val="1000"/>
+              </a:spcBef>
+              <a:buFont typeface="Arial" panose="020B0604020202020204" pitchFamily="34" charset="0"/>
+              <a:buChar char="•"/>
+              <a:defRPr sz="2800" kern="1200">
+                <a:solidFill>
+                  <a:schemeClr val="tx1"/>
+                </a:solidFill>
+                <a:latin typeface="+mn-lt"/>
+                <a:ea typeface="+mn-ea"/>
+                <a:cs typeface="+mn-cs"/>
+              </a:defRPr>
+            </a:lvl1pPr>
+            <a:lvl2pPr marL="685800" indent="-228600" algn="l" defTabSz="914400" rtl="0" eaLnBrk="1" latinLnBrk="0" hangingPunct="1">
+              <a:lnSpc>
+                <a:spcPct val="90000"/>
+              </a:lnSpc>
+              <a:spcBef>
+                <a:spcPts val="500"/>
+              </a:spcBef>
+              <a:buFont typeface="Arial" panose="020B0604020202020204" pitchFamily="34" charset="0"/>
+              <a:buChar char="•"/>
+              <a:defRPr sz="2400" kern="1200">
+                <a:solidFill>
+                  <a:schemeClr val="tx1"/>
+                </a:solidFill>
+                <a:latin typeface="+mn-lt"/>
+                <a:ea typeface="+mn-ea"/>
+                <a:cs typeface="+mn-cs"/>
+              </a:defRPr>
+            </a:lvl2pPr>
+            <a:lvl3pPr marL="1143000" indent="-228600" algn="l" defTabSz="914400" rtl="0" eaLnBrk="1" latinLnBrk="0" hangingPunct="1">
+              <a:lnSpc>
+                <a:spcPct val="90000"/>
+              </a:lnSpc>
+              <a:spcBef>
+                <a:spcPts val="500"/>
+              </a:spcBef>
+              <a:buFont typeface="Arial" panose="020B0604020202020204" pitchFamily="34" charset="0"/>
+              <a:buChar char="•"/>
+              <a:defRPr sz="2000" kern="1200">
+                <a:solidFill>
+                  <a:schemeClr val="tx1"/>
+                </a:solidFill>
+                <a:latin typeface="+mn-lt"/>
+                <a:ea typeface="+mn-ea"/>
+                <a:cs typeface="+mn-cs"/>
+              </a:defRPr>
+            </a:lvl3pPr>
+            <a:lvl4pPr marL="1600200" indent="-228600" algn="l" defTabSz="914400" rtl="0" eaLnBrk="1" latinLnBrk="0" hangingPunct="1">
+              <a:lnSpc>
+                <a:spcPct val="90000"/>
+              </a:lnSpc>
+              <a:spcBef>
+                <a:spcPts val="500"/>
+              </a:spcBef>
+              <a:buFont typeface="Arial" panose="020B0604020202020204" pitchFamily="34" charset="0"/>
+              <a:buChar char="•"/>
+              <a:defRPr sz="1800" kern="1200">
+                <a:solidFill>
+                  <a:schemeClr val="tx1"/>
+                </a:solidFill>
+                <a:latin typeface="+mn-lt"/>
+                <a:ea typeface="+mn-ea"/>
+                <a:cs typeface="+mn-cs"/>
+              </a:defRPr>
+            </a:lvl4pPr>
+            <a:lvl5pPr marL="2057400" indent="-228600" algn="l" defTabSz="914400" rtl="0" eaLnBrk="1" latinLnBrk="0" hangingPunct="1">
+              <a:lnSpc>
+                <a:spcPct val="90000"/>
+              </a:lnSpc>
+              <a:spcBef>
+                <a:spcPts val="500"/>
+              </a:spcBef>
+              <a:buFont typeface="Arial" panose="020B0604020202020204" pitchFamily="34" charset="0"/>
+              <a:buChar char="•"/>
+              <a:defRPr sz="1800" kern="1200">
+                <a:solidFill>
+                  <a:schemeClr val="tx1"/>
+                </a:solidFill>
+                <a:latin typeface="+mn-lt"/>
+                <a:ea typeface="+mn-ea"/>
+                <a:cs typeface="+mn-cs"/>
+              </a:defRPr>
+            </a:lvl5pPr>
+            <a:lvl6pPr marL="2514600" indent="-228600" algn="l" defTabSz="914400" rtl="0" eaLnBrk="1" latinLnBrk="0" hangingPunct="1">
+              <a:lnSpc>
+                <a:spcPct val="90000"/>
+              </a:lnSpc>
+              <a:spcBef>
+                <a:spcPts val="500"/>
+              </a:spcBef>
+              <a:buFont typeface="Arial" panose="020B0604020202020204" pitchFamily="34" charset="0"/>
+              <a:buChar char="•"/>
+              <a:defRPr sz="1800" kern="1200">
+                <a:solidFill>
+                  <a:schemeClr val="tx1"/>
+                </a:solidFill>
+                <a:latin typeface="+mn-lt"/>
+                <a:ea typeface="+mn-ea"/>
+                <a:cs typeface="+mn-cs"/>
+              </a:defRPr>
+            </a:lvl6pPr>
+            <a:lvl7pPr marL="2971800" indent="-228600" algn="l" defTabSz="914400" rtl="0" eaLnBrk="1" latinLnBrk="0" hangingPunct="1">
+              <a:lnSpc>
+                <a:spcPct val="90000"/>
+              </a:lnSpc>
+              <a:spcBef>
+                <a:spcPts val="500"/>
+              </a:spcBef>
+              <a:buFont typeface="Arial" panose="020B0604020202020204" pitchFamily="34" charset="0"/>
+              <a:buChar char="•"/>
+              <a:defRPr sz="1800" kern="1200">
+                <a:solidFill>
+                  <a:schemeClr val="tx1"/>
+                </a:solidFill>
+                <a:latin typeface="+mn-lt"/>
+                <a:ea typeface="+mn-ea"/>
+                <a:cs typeface="+mn-cs"/>
+              </a:defRPr>
+            </a:lvl7pPr>
+            <a:lvl8pPr marL="3429000" indent="-228600" algn="l" defTabSz="914400" rtl="0" eaLnBrk="1" latinLnBrk="0" hangingPunct="1">
+              <a:lnSpc>
+                <a:spcPct val="90000"/>
+              </a:lnSpc>
+              <a:spcBef>
+                <a:spcPts val="500"/>
+              </a:spcBef>
+              <a:buFont typeface="Arial" panose="020B0604020202020204" pitchFamily="34" charset="0"/>
+              <a:buChar char="•"/>
+              <a:defRPr sz="1800" kern="1200">
+                <a:solidFill>
+                  <a:schemeClr val="tx1"/>
+                </a:solidFill>
+                <a:latin typeface="+mn-lt"/>
+                <a:ea typeface="+mn-ea"/>
+                <a:cs typeface="+mn-cs"/>
+              </a:defRPr>
+            </a:lvl8pPr>
+            <a:lvl9pPr marL="3886200" indent="-228600" algn="l" defTabSz="914400" rtl="0" eaLnBrk="1" latinLnBrk="0" hangingPunct="1">
+              <a:lnSpc>
+                <a:spcPct val="90000"/>
+              </a:lnSpc>
+              <a:spcBef>
+                <a:spcPts val="500"/>
+              </a:spcBef>
+              <a:buFont typeface="Arial" panose="020B0604020202020204" pitchFamily="34" charset="0"/>
+              <a:buChar char="•"/>
+              <a:defRPr sz="1800" kern="1200">
+                <a:solidFill>
+                  <a:schemeClr val="tx1"/>
+                </a:solidFill>
+                <a:latin typeface="+mn-lt"/>
+                <a:ea typeface="+mn-ea"/>
+                <a:cs typeface="+mn-cs"/>
+              </a:defRPr>
+            </a:lvl9pPr>
+          </a:lstStyle>
+          <a:p>
+            <a:r>
+              <a:rPr lang="tr-TR" dirty="0"/>
+              <a:t>Oluşan sanal ortam dizinine girme ve dev klasörü oluşturma</a:t>
+            </a:r>
+          </a:p>
+          <a:p>
+            <a:pPr marL="0" indent="0">
+              <a:buFont typeface="Arial" panose="020B0604020202020204" pitchFamily="34" charset="0"/>
+              <a:buNone/>
+            </a:pPr>
+            <a:r>
+              <a:rPr lang="tr-TR" dirty="0">
+                <a:latin typeface="Consolas" panose="020B0609020204030204" pitchFamily="49" charset="0"/>
+              </a:rPr>
+              <a:t>	</a:t>
+            </a:r>
+            <a:r>
+              <a:rPr lang="tr-TR" dirty="0">
+                <a:solidFill>
+                  <a:srgbClr val="FF0000"/>
+                </a:solidFill>
+                <a:latin typeface="Consolas" panose="020B0609020204030204" pitchFamily="49" charset="0"/>
+              </a:rPr>
+              <a:t>&gt;cd ml</a:t>
+            </a:r>
+          </a:p>
+          <a:p>
+            <a:pPr marL="0" indent="0">
+              <a:buNone/>
+            </a:pPr>
+            <a:r>
+              <a:rPr lang="tr-TR" dirty="0">
+                <a:solidFill>
+                  <a:srgbClr val="FF0000"/>
+                </a:solidFill>
+                <a:latin typeface="Consolas" panose="020B0609020204030204" pitchFamily="49" charset="0"/>
+              </a:rPr>
+              <a:t>	&gt;</a:t>
+            </a:r>
+            <a:r>
+              <a:rPr lang="tr-TR" dirty="0" err="1">
+                <a:solidFill>
+                  <a:srgbClr val="FF0000"/>
+                </a:solidFill>
+                <a:latin typeface="Consolas" panose="020B0609020204030204" pitchFamily="49" charset="0"/>
+              </a:rPr>
+              <a:t>mkdir</a:t>
+            </a:r>
+            <a:r>
+              <a:rPr lang="tr-TR" dirty="0">
+                <a:solidFill>
+                  <a:srgbClr val="FF0000"/>
+                </a:solidFill>
+                <a:latin typeface="Consolas" panose="020B0609020204030204" pitchFamily="49" charset="0"/>
+              </a:rPr>
+              <a:t> dev</a:t>
+            </a:r>
+          </a:p>
+          <a:p>
+            <a:r>
+              <a:rPr lang="tr-TR" dirty="0"/>
+              <a:t>Kontrol</a:t>
+            </a:r>
+          </a:p>
+          <a:p>
+            <a:pPr marL="0" indent="0">
+              <a:buNone/>
+            </a:pPr>
+            <a:r>
+              <a:rPr lang="tr-TR" dirty="0">
+                <a:solidFill>
+                  <a:srgbClr val="FF0000"/>
+                </a:solidFill>
+                <a:latin typeface="Consolas" panose="020B0609020204030204" pitchFamily="49" charset="0"/>
+              </a:rPr>
+              <a:t>	 &gt;</a:t>
+            </a:r>
+            <a:r>
+              <a:rPr lang="tr-TR" dirty="0" err="1">
+                <a:solidFill>
+                  <a:srgbClr val="FF0000"/>
+                </a:solidFill>
+                <a:latin typeface="Consolas" panose="020B0609020204030204" pitchFamily="49" charset="0"/>
+              </a:rPr>
+              <a:t>dir</a:t>
+            </a:r>
+            <a:endParaRPr lang="tr-TR" dirty="0">
+              <a:solidFill>
+                <a:srgbClr val="FF0000"/>
+              </a:solidFill>
+              <a:latin typeface="Consolas" panose="020B0609020204030204" pitchFamily="49" charset="0"/>
+            </a:endParaRPr>
+          </a:p>
+          <a:p>
+            <a:pPr marL="914400" lvl="2" indent="0">
+              <a:buNone/>
+            </a:pPr>
+            <a:endParaRPr lang="tr-TR" dirty="0">
+              <a:latin typeface="Consolas" panose="020B0609020204030204" pitchFamily="49" charset="0"/>
+            </a:endParaRPr>
+          </a:p>
+          <a:p>
+            <a:pPr marL="914400" lvl="2" indent="0">
+              <a:buNone/>
+            </a:pPr>
+            <a:r>
+              <a:rPr lang="tr-TR" dirty="0">
+                <a:latin typeface="Consolas" panose="020B0609020204030204" pitchFamily="49" charset="0"/>
+              </a:rPr>
+              <a:t>Volume in </a:t>
+            </a:r>
+            <a:r>
+              <a:rPr lang="tr-TR" dirty="0" err="1">
+                <a:latin typeface="Consolas" panose="020B0609020204030204" pitchFamily="49" charset="0"/>
+              </a:rPr>
+              <a:t>drive</a:t>
+            </a:r>
+            <a:r>
+              <a:rPr lang="tr-TR" dirty="0">
+                <a:latin typeface="Consolas" panose="020B0609020204030204" pitchFamily="49" charset="0"/>
+              </a:rPr>
+              <a:t> C has </a:t>
+            </a:r>
+            <a:r>
+              <a:rPr lang="tr-TR" dirty="0" err="1">
+                <a:latin typeface="Consolas" panose="020B0609020204030204" pitchFamily="49" charset="0"/>
+              </a:rPr>
+              <a:t>no</a:t>
+            </a:r>
+            <a:r>
+              <a:rPr lang="tr-TR" dirty="0">
+                <a:latin typeface="Consolas" panose="020B0609020204030204" pitchFamily="49" charset="0"/>
+              </a:rPr>
+              <a:t> </a:t>
+            </a:r>
+            <a:r>
+              <a:rPr lang="tr-TR" dirty="0" err="1">
+                <a:latin typeface="Consolas" panose="020B0609020204030204" pitchFamily="49" charset="0"/>
+              </a:rPr>
+              <a:t>label</a:t>
+            </a:r>
+            <a:r>
+              <a:rPr lang="tr-TR" dirty="0">
+                <a:latin typeface="Consolas" panose="020B0609020204030204" pitchFamily="49" charset="0"/>
+              </a:rPr>
+              <a:t>.</a:t>
+            </a:r>
+          </a:p>
+          <a:p>
+            <a:pPr marL="914400" lvl="2" indent="0">
+              <a:buNone/>
+            </a:pPr>
+            <a:r>
+              <a:rPr lang="tr-TR" dirty="0">
+                <a:latin typeface="Consolas" panose="020B0609020204030204" pitchFamily="49" charset="0"/>
+              </a:rPr>
+              <a:t> Volume </a:t>
+            </a:r>
+            <a:r>
+              <a:rPr lang="tr-TR" dirty="0" err="1">
+                <a:latin typeface="Consolas" panose="020B0609020204030204" pitchFamily="49" charset="0"/>
+              </a:rPr>
+              <a:t>Serial</a:t>
+            </a:r>
+            <a:r>
+              <a:rPr lang="tr-TR" dirty="0">
+                <a:latin typeface="Consolas" panose="020B0609020204030204" pitchFamily="49" charset="0"/>
+              </a:rPr>
+              <a:t> </a:t>
+            </a:r>
+            <a:r>
+              <a:rPr lang="tr-TR" dirty="0" err="1">
+                <a:latin typeface="Consolas" panose="020B0609020204030204" pitchFamily="49" charset="0"/>
+              </a:rPr>
+              <a:t>Number</a:t>
+            </a:r>
+            <a:r>
+              <a:rPr lang="tr-TR" dirty="0">
+                <a:latin typeface="Consolas" panose="020B0609020204030204" pitchFamily="49" charset="0"/>
+              </a:rPr>
+              <a:t> is 55F6-35C4</a:t>
+            </a:r>
+          </a:p>
+          <a:p>
+            <a:pPr marL="914400" lvl="2" indent="0">
+              <a:buNone/>
+            </a:pPr>
+            <a:endParaRPr lang="tr-TR" dirty="0">
+              <a:latin typeface="Consolas" panose="020B0609020204030204" pitchFamily="49" charset="0"/>
+            </a:endParaRPr>
+          </a:p>
+          <a:p>
+            <a:pPr marL="914400" lvl="2" indent="0">
+              <a:buNone/>
+            </a:pPr>
+            <a:r>
+              <a:rPr lang="tr-TR" dirty="0">
+                <a:latin typeface="Consolas" panose="020B0609020204030204" pitchFamily="49" charset="0"/>
+              </a:rPr>
+              <a:t> Directory of C:\Users\user\python_egitim\ml</a:t>
+            </a:r>
+          </a:p>
+          <a:p>
+            <a:pPr marL="914400" lvl="2" indent="0">
+              <a:buNone/>
+            </a:pPr>
+            <a:endParaRPr lang="tr-TR" dirty="0">
+              <a:latin typeface="Consolas" panose="020B0609020204030204" pitchFamily="49" charset="0"/>
+            </a:endParaRPr>
+          </a:p>
+          <a:p>
+            <a:pPr marL="914400" lvl="2" indent="0">
+              <a:buNone/>
+            </a:pPr>
+            <a:r>
+              <a:rPr lang="tr-TR" dirty="0">
+                <a:latin typeface="Consolas" panose="020B0609020204030204" pitchFamily="49" charset="0"/>
+              </a:rPr>
+              <a:t>01.10.2019  17:45    &lt;DIR&gt;          .</a:t>
+            </a:r>
+          </a:p>
+          <a:p>
+            <a:pPr marL="914400" lvl="2" indent="0">
+              <a:buNone/>
+            </a:pPr>
+            <a:r>
+              <a:rPr lang="tr-TR" dirty="0">
+                <a:latin typeface="Consolas" panose="020B0609020204030204" pitchFamily="49" charset="0"/>
+              </a:rPr>
+              <a:t>01.10.2019  17:45    &lt;DIR&gt;          ..</a:t>
+            </a:r>
+          </a:p>
+          <a:p>
+            <a:pPr marL="914400" lvl="2" indent="0">
+              <a:buNone/>
+            </a:pPr>
+            <a:r>
+              <a:rPr lang="tr-TR" dirty="0">
+                <a:latin typeface="Consolas" panose="020B0609020204030204" pitchFamily="49" charset="0"/>
+              </a:rPr>
+              <a:t>01.10.2019  17:45    &lt;DIR&gt;          dev</a:t>
+            </a:r>
+          </a:p>
+          <a:p>
+            <a:pPr marL="914400" lvl="2" indent="0">
+              <a:buNone/>
+            </a:pPr>
+            <a:r>
+              <a:rPr lang="tr-TR" dirty="0">
+                <a:latin typeface="Consolas" panose="020B0609020204030204" pitchFamily="49" charset="0"/>
+              </a:rPr>
+              <a:t>01.10.2019  17:30    &lt;DIR&gt;          </a:t>
+            </a:r>
+            <a:r>
+              <a:rPr lang="tr-TR" dirty="0" err="1">
+                <a:latin typeface="Consolas" panose="020B0609020204030204" pitchFamily="49" charset="0"/>
+              </a:rPr>
+              <a:t>Include</a:t>
+            </a:r>
+            <a:endParaRPr lang="tr-TR" dirty="0">
+              <a:latin typeface="Consolas" panose="020B0609020204030204" pitchFamily="49" charset="0"/>
+            </a:endParaRPr>
+          </a:p>
+          <a:p>
+            <a:pPr marL="914400" lvl="2" indent="0">
+              <a:buNone/>
+            </a:pPr>
+            <a:r>
+              <a:rPr lang="tr-TR" dirty="0">
+                <a:latin typeface="Consolas" panose="020B0609020204030204" pitchFamily="49" charset="0"/>
+              </a:rPr>
+              <a:t>01.10.2019  17:30    &lt;DIR&gt;          </a:t>
+            </a:r>
+            <a:r>
+              <a:rPr lang="tr-TR" dirty="0" err="1">
+                <a:latin typeface="Consolas" panose="020B0609020204030204" pitchFamily="49" charset="0"/>
+              </a:rPr>
+              <a:t>Lib</a:t>
+            </a:r>
+            <a:endParaRPr lang="tr-TR" dirty="0">
+              <a:latin typeface="Consolas" panose="020B0609020204030204" pitchFamily="49" charset="0"/>
+            </a:endParaRPr>
+          </a:p>
+          <a:p>
+            <a:pPr marL="914400" lvl="2" indent="0">
+              <a:buNone/>
+            </a:pPr>
+            <a:r>
+              <a:rPr lang="tr-TR" dirty="0">
+                <a:latin typeface="Consolas" panose="020B0609020204030204" pitchFamily="49" charset="0"/>
+              </a:rPr>
+              <a:t>01.10.2019  17:30                82 </a:t>
+            </a:r>
+            <a:r>
+              <a:rPr lang="tr-TR" dirty="0" err="1">
+                <a:latin typeface="Consolas" panose="020B0609020204030204" pitchFamily="49" charset="0"/>
+              </a:rPr>
+              <a:t>pyvenv.cfg</a:t>
+            </a:r>
+            <a:endParaRPr lang="tr-TR" dirty="0">
+              <a:latin typeface="Consolas" panose="020B0609020204030204" pitchFamily="49" charset="0"/>
+            </a:endParaRPr>
+          </a:p>
+          <a:p>
+            <a:pPr marL="914400" lvl="2" indent="0">
+              <a:buNone/>
+            </a:pPr>
+            <a:r>
+              <a:rPr lang="tr-TR" dirty="0">
+                <a:latin typeface="Consolas" panose="020B0609020204030204" pitchFamily="49" charset="0"/>
+              </a:rPr>
+              <a:t>01.10.2019  17:30    &lt;DIR&gt;          </a:t>
+            </a:r>
+            <a:r>
+              <a:rPr lang="tr-TR" dirty="0" err="1">
+                <a:latin typeface="Consolas" panose="020B0609020204030204" pitchFamily="49" charset="0"/>
+              </a:rPr>
+              <a:t>Scripts</a:t>
+            </a:r>
+            <a:endParaRPr lang="tr-TR" dirty="0">
+              <a:latin typeface="Consolas" panose="020B0609020204030204" pitchFamily="49" charset="0"/>
+            </a:endParaRPr>
+          </a:p>
+          <a:p>
+            <a:pPr marL="914400" lvl="2" indent="0">
+              <a:buNone/>
+            </a:pPr>
+            <a:r>
+              <a:rPr lang="tr-TR" dirty="0">
+                <a:latin typeface="Consolas" panose="020B0609020204030204" pitchFamily="49" charset="0"/>
+              </a:rPr>
+              <a:t>               1 File(s)             82 </a:t>
+            </a:r>
+            <a:r>
+              <a:rPr lang="tr-TR" dirty="0" err="1">
+                <a:latin typeface="Consolas" panose="020B0609020204030204" pitchFamily="49" charset="0"/>
+              </a:rPr>
+              <a:t>bytes</a:t>
+            </a:r>
+            <a:endParaRPr lang="tr-TR" dirty="0">
+              <a:latin typeface="Consolas" panose="020B0609020204030204" pitchFamily="49" charset="0"/>
+            </a:endParaRPr>
+          </a:p>
+          <a:p>
+            <a:pPr marL="914400" lvl="2" indent="0">
+              <a:buNone/>
+            </a:pPr>
+            <a:r>
+              <a:rPr lang="tr-TR" dirty="0">
+                <a:latin typeface="Consolas" panose="020B0609020204030204" pitchFamily="49" charset="0"/>
+              </a:rPr>
+              <a:t>               6 </a:t>
+            </a:r>
+            <a:r>
+              <a:rPr lang="tr-TR" dirty="0" err="1">
+                <a:latin typeface="Consolas" panose="020B0609020204030204" pitchFamily="49" charset="0"/>
+              </a:rPr>
+              <a:t>Dir</a:t>
+            </a:r>
+            <a:r>
+              <a:rPr lang="tr-TR" dirty="0">
+                <a:latin typeface="Consolas" panose="020B0609020204030204" pitchFamily="49" charset="0"/>
+              </a:rPr>
+              <a:t>(s)  695.022.501.888 </a:t>
+            </a:r>
+            <a:r>
+              <a:rPr lang="tr-TR" dirty="0" err="1">
+                <a:latin typeface="Consolas" panose="020B0609020204030204" pitchFamily="49" charset="0"/>
+              </a:rPr>
+              <a:t>bytes</a:t>
+            </a:r>
+            <a:r>
+              <a:rPr lang="tr-TR" dirty="0">
+                <a:latin typeface="Consolas" panose="020B0609020204030204" pitchFamily="49" charset="0"/>
+              </a:rPr>
+              <a:t> </a:t>
+            </a:r>
+            <a:r>
+              <a:rPr lang="tr-TR" dirty="0" err="1">
+                <a:latin typeface="Consolas" panose="020B0609020204030204" pitchFamily="49" charset="0"/>
+              </a:rPr>
+              <a:t>free</a:t>
+            </a:r>
+            <a:endParaRPr lang="tr-TR" dirty="0">
+              <a:latin typeface="Consolas" panose="020B0609020204030204" pitchFamily="49" charset="0"/>
+            </a:endParaRPr>
+          </a:p>
+        </p:txBody>
+      </p:sp>
+      <p:sp>
+        <p:nvSpPr>
+          <p:cNvPr id="7" name="Unvan 1">
+            <a:extLst>
+              <a:ext uri="{FF2B5EF4-FFF2-40B4-BE49-F238E27FC236}">
+                <a16:creationId xmlns:a16="http://schemas.microsoft.com/office/drawing/2014/main" id="{874704D3-D16C-4D8E-8384-BE18FA6F9380}"/>
+              </a:ext>
+            </a:extLst>
+          </p:cNvPr>
+          <p:cNvSpPr>
+            <a:spLocks noGrp="1"/>
+          </p:cNvSpPr>
+          <p:nvPr>
+            <p:ph type="title"/>
+          </p:nvPr>
+        </p:nvSpPr>
+        <p:spPr>
+          <a:xfrm>
+            <a:off x="838200" y="325398"/>
+            <a:ext cx="10515600" cy="722895"/>
+          </a:xfrm>
+        </p:spPr>
+        <p:txBody>
+          <a:bodyPr>
+            <a:normAutofit/>
+          </a:bodyPr>
+          <a:lstStyle/>
+          <a:p>
+            <a:pPr algn="ctr"/>
+            <a:r>
+              <a:rPr lang="en-US" sz="3800" b="1" dirty="0">
+                <a:solidFill>
+                  <a:srgbClr val="FF1F20"/>
+                </a:solidFill>
+                <a:latin typeface="Arial" panose="020B0604020202020204" pitchFamily="34" charset="0"/>
+                <a:ea typeface="Verdana" panose="020B0604030504040204" pitchFamily="34" charset="0"/>
+                <a:cs typeface="Arial" panose="020B0604020202020204" pitchFamily="34" charset="0"/>
+              </a:rPr>
+              <a:t>PYTHON </a:t>
+            </a:r>
+            <a:r>
+              <a:rPr lang="tr-TR" sz="3800" b="1" dirty="0">
+                <a:solidFill>
+                  <a:srgbClr val="FF1F20"/>
+                </a:solidFill>
+                <a:latin typeface="Arial" panose="020B0604020202020204" pitchFamily="34" charset="0"/>
+                <a:ea typeface="Verdana" panose="020B0604030504040204" pitchFamily="34" charset="0"/>
+                <a:cs typeface="Arial" panose="020B0604020202020204" pitchFamily="34" charset="0"/>
+              </a:rPr>
+              <a:t>VIRTUALENV</a:t>
+            </a:r>
+            <a:endParaRPr lang="en-US" sz="3800" b="1" dirty="0">
+              <a:solidFill>
+                <a:srgbClr val="FF1F20"/>
+              </a:solidFill>
+              <a:latin typeface="Arial" panose="020B0604020202020204" pitchFamily="34" charset="0"/>
+              <a:ea typeface="Verdana" panose="020B0604030504040204" pitchFamily="34" charset="0"/>
+              <a:cs typeface="Arial" panose="020B0604020202020204" pitchFamily="34" charset="0"/>
+            </a:endParaRPr>
+          </a:p>
+        </p:txBody>
+      </p:sp>
+    </p:spTree>
+    <p:extLst>
+      <p:ext uri="{BB962C8B-B14F-4D97-AF65-F5344CB8AC3E}">
+        <p14:creationId xmlns:p14="http://schemas.microsoft.com/office/powerpoint/2010/main" val="123194321"/>
       </p:ext>
     </p:extLst>
   </p:cSld>

</xml_diff>